<commit_message>
Préparation du cours 4
</commit_message>
<xml_diff>
--- a/rel-electro-immersif-originals/Détecter un changement de valeur.pptx
+++ b/rel-electro-immersif-originals/Détecter un changement de valeur.pptx
@@ -6,11 +6,12 @@
   </p:sldMasterIdLst>
   <p:sldIdLst>
     <p:sldId id="3057" r:id="rId2"/>
-    <p:sldId id="2902" r:id="rId3"/>
-    <p:sldId id="2907" r:id="rId4"/>
-    <p:sldId id="2917" r:id="rId5"/>
-    <p:sldId id="2920" r:id="rId6"/>
-    <p:sldId id="2921" r:id="rId7"/>
+    <p:sldId id="3058" r:id="rId3"/>
+    <p:sldId id="2902" r:id="rId4"/>
+    <p:sldId id="2907" r:id="rId5"/>
+    <p:sldId id="2917" r:id="rId6"/>
+    <p:sldId id="2920" r:id="rId7"/>
+    <p:sldId id="2921" r:id="rId8"/>
   </p:sldIdLst>
   <p:sldSz cx="12192000" cy="6858000"/>
   <p:notesSz cx="6858000" cy="9144000"/>
@@ -120,13 +121,340 @@
 <file path=ppt/revisionInfo.xml><?xml version="1.0" encoding="utf-8"?>
 <p1510:revInfo xmlns:a="http://schemas.openxmlformats.org/drawingml/2006/main" xmlns:r="http://schemas.openxmlformats.org/officeDocument/2006/relationships" xmlns:p1510="http://schemas.microsoft.com/office/powerpoint/2015/10/main">
   <p1510:revLst>
-    <p1510:client id="{E96FBD7B-6B81-4FE2-835E-0DB4EB96A5E5}" v="1" dt="2022-09-12T18:59:15.920"/>
+    <p1510:client id="{E96FBD7B-6B81-4FE2-835E-0DB4EB96A5E5}" v="5" dt="2022-09-13T23:25:29.911"/>
   </p1510:revLst>
 </p1510:revInfo>
 </file>
 
 <file path=ppt/changesInfos/changesInfo1.xml><?xml version="1.0" encoding="utf-8"?>
 <pc:chgInfo xmlns:a="http://schemas.openxmlformats.org/drawingml/2006/main" xmlns:r="http://schemas.openxmlformats.org/officeDocument/2006/relationships" xmlns:ac="http://schemas.microsoft.com/office/drawing/2013/main/command" xmlns:pc="http://schemas.microsoft.com/office/powerpoint/2013/main/command">
+  <pc:docChgLst>
+    <pc:chgData name="Thomas O Fredericks" userId="9a40f032a9b16fc7" providerId="LiveId" clId="{E96FBD7B-6B81-4FE2-835E-0DB4EB96A5E5}"/>
+    <pc:docChg chg="undo custSel addSld modSld">
+      <pc:chgData name="Thomas O Fredericks" userId="9a40f032a9b16fc7" providerId="LiveId" clId="{E96FBD7B-6B81-4FE2-835E-0DB4EB96A5E5}" dt="2022-09-13T23:25:54.688" v="97" actId="1076"/>
+      <pc:docMkLst>
+        <pc:docMk/>
+      </pc:docMkLst>
+      <pc:sldChg chg="addSp delSp modSp">
+        <pc:chgData name="Thomas O Fredericks" userId="9a40f032a9b16fc7" providerId="LiveId" clId="{E96FBD7B-6B81-4FE2-835E-0DB4EB96A5E5}" dt="2022-09-13T23:25:54.688" v="97" actId="1076"/>
+        <pc:sldMkLst>
+          <pc:docMk/>
+          <pc:sldMk cId="3962952338" sldId="3057"/>
+        </pc:sldMkLst>
+        <pc:spChg chg="add del mod">
+          <ac:chgData name="Thomas O Fredericks" userId="9a40f032a9b16fc7" providerId="LiveId" clId="{E96FBD7B-6B81-4FE2-835E-0DB4EB96A5E5}" dt="2022-09-13T23:25:17.179" v="86" actId="478"/>
+          <ac:spMkLst>
+            <pc:docMk/>
+            <pc:sldMk cId="3962952338" sldId="3057"/>
+            <ac:spMk id="3" creationId="{A332EF14-A865-404C-BEC8-4A15884F32D9}"/>
+          </ac:spMkLst>
+        </pc:spChg>
+        <pc:spChg chg="add mod">
+          <ac:chgData name="Thomas O Fredericks" userId="9a40f032a9b16fc7" providerId="LiveId" clId="{E96FBD7B-6B81-4FE2-835E-0DB4EB96A5E5}" dt="2022-09-13T23:25:42.115" v="93" actId="255"/>
+          <ac:spMkLst>
+            <pc:docMk/>
+            <pc:sldMk cId="3962952338" sldId="3057"/>
+            <ac:spMk id="6" creationId="{6A688945-F493-4AB4-8208-BC2ECA1DEA6E}"/>
+          </ac:spMkLst>
+        </pc:spChg>
+        <pc:spChg chg="del">
+          <ac:chgData name="Thomas O Fredericks" userId="9a40f032a9b16fc7" providerId="LiveId" clId="{E96FBD7B-6B81-4FE2-835E-0DB4EB96A5E5}" dt="2022-09-13T23:25:13.732" v="85" actId="478"/>
+          <ac:spMkLst>
+            <pc:docMk/>
+            <pc:sldMk cId="3962952338" sldId="3057"/>
+            <ac:spMk id="7" creationId="{42C10F38-8247-4F6E-B365-EB0CBA01584C}"/>
+          </ac:spMkLst>
+        </pc:spChg>
+        <pc:spChg chg="add mod">
+          <ac:chgData name="Thomas O Fredericks" userId="9a40f032a9b16fc7" providerId="LiveId" clId="{E96FBD7B-6B81-4FE2-835E-0DB4EB96A5E5}" dt="2022-09-13T23:25:42.115" v="93" actId="255"/>
+          <ac:spMkLst>
+            <pc:docMk/>
+            <pc:sldMk cId="3962952338" sldId="3057"/>
+            <ac:spMk id="8" creationId="{A13355A9-ED22-4033-B46E-C18B09750D73}"/>
+          </ac:spMkLst>
+        </pc:spChg>
+        <pc:spChg chg="add mod">
+          <ac:chgData name="Thomas O Fredericks" userId="9a40f032a9b16fc7" providerId="LiveId" clId="{E96FBD7B-6B81-4FE2-835E-0DB4EB96A5E5}" dt="2022-09-13T23:25:42.115" v="93" actId="255"/>
+          <ac:spMkLst>
+            <pc:docMk/>
+            <pc:sldMk cId="3962952338" sldId="3057"/>
+            <ac:spMk id="10" creationId="{D105EDFE-ECA6-4C14-83AF-C74CF5867C21}"/>
+          </ac:spMkLst>
+        </pc:spChg>
+        <pc:spChg chg="add mod">
+          <ac:chgData name="Thomas O Fredericks" userId="9a40f032a9b16fc7" providerId="LiveId" clId="{E96FBD7B-6B81-4FE2-835E-0DB4EB96A5E5}" dt="2022-09-13T23:25:42.115" v="93" actId="255"/>
+          <ac:spMkLst>
+            <pc:docMk/>
+            <pc:sldMk cId="3962952338" sldId="3057"/>
+            <ac:spMk id="12" creationId="{2B582A2C-D423-4D6D-BC16-9EDBC7DB9CFE}"/>
+          </ac:spMkLst>
+        </pc:spChg>
+        <pc:spChg chg="add mod">
+          <ac:chgData name="Thomas O Fredericks" userId="9a40f032a9b16fc7" providerId="LiveId" clId="{E96FBD7B-6B81-4FE2-835E-0DB4EB96A5E5}" dt="2022-09-13T23:25:42.115" v="93" actId="255"/>
+          <ac:spMkLst>
+            <pc:docMk/>
+            <pc:sldMk cId="3962952338" sldId="3057"/>
+            <ac:spMk id="13" creationId="{24F84985-5477-471E-AB07-635CB3C28EE7}"/>
+          </ac:spMkLst>
+        </pc:spChg>
+        <pc:spChg chg="add mod">
+          <ac:chgData name="Thomas O Fredericks" userId="9a40f032a9b16fc7" providerId="LiveId" clId="{E96FBD7B-6B81-4FE2-835E-0DB4EB96A5E5}" dt="2022-09-13T23:25:42.115" v="93" actId="255"/>
+          <ac:spMkLst>
+            <pc:docMk/>
+            <pc:sldMk cId="3962952338" sldId="3057"/>
+            <ac:spMk id="17" creationId="{6032D1AB-788F-4459-8A14-DFC1A0CD6CF5}"/>
+          </ac:spMkLst>
+        </pc:spChg>
+        <pc:grpChg chg="add mod">
+          <ac:chgData name="Thomas O Fredericks" userId="9a40f032a9b16fc7" providerId="LiveId" clId="{E96FBD7B-6B81-4FE2-835E-0DB4EB96A5E5}" dt="2022-09-13T23:25:54.688" v="97" actId="1076"/>
+          <ac:grpSpMkLst>
+            <pc:docMk/>
+            <pc:sldMk cId="3962952338" sldId="3057"/>
+            <ac:grpSpMk id="4" creationId="{00DD97B2-80E9-44BC-981B-CD7333EDCA3A}"/>
+          </ac:grpSpMkLst>
+        </pc:grpChg>
+        <pc:picChg chg="mod">
+          <ac:chgData name="Thomas O Fredericks" userId="9a40f032a9b16fc7" providerId="LiveId" clId="{E96FBD7B-6B81-4FE2-835E-0DB4EB96A5E5}" dt="2022-09-13T23:25:51.943" v="96" actId="1076"/>
+          <ac:picMkLst>
+            <pc:docMk/>
+            <pc:sldMk cId="3962952338" sldId="3057"/>
+            <ac:picMk id="5" creationId="{1397FD11-7C2F-452A-A454-A8CB11883FD9}"/>
+          </ac:picMkLst>
+        </pc:picChg>
+        <pc:cxnChg chg="add mod">
+          <ac:chgData name="Thomas O Fredericks" userId="9a40f032a9b16fc7" providerId="LiveId" clId="{E96FBD7B-6B81-4FE2-835E-0DB4EB96A5E5}" dt="2022-09-13T23:25:29.910" v="89" actId="164"/>
+          <ac:cxnSpMkLst>
+            <pc:docMk/>
+            <pc:sldMk cId="3962952338" sldId="3057"/>
+            <ac:cxnSpMk id="9" creationId="{4D7F3A33-2325-4B38-A97E-6AEB14A975C2}"/>
+          </ac:cxnSpMkLst>
+        </pc:cxnChg>
+        <pc:cxnChg chg="add mod">
+          <ac:chgData name="Thomas O Fredericks" userId="9a40f032a9b16fc7" providerId="LiveId" clId="{E96FBD7B-6B81-4FE2-835E-0DB4EB96A5E5}" dt="2022-09-13T23:25:29.910" v="89" actId="164"/>
+          <ac:cxnSpMkLst>
+            <pc:docMk/>
+            <pc:sldMk cId="3962952338" sldId="3057"/>
+            <ac:cxnSpMk id="11" creationId="{25010A16-40AD-43E0-A3CB-D56B07615C07}"/>
+          </ac:cxnSpMkLst>
+        </pc:cxnChg>
+        <pc:cxnChg chg="add mod">
+          <ac:chgData name="Thomas O Fredericks" userId="9a40f032a9b16fc7" providerId="LiveId" clId="{E96FBD7B-6B81-4FE2-835E-0DB4EB96A5E5}" dt="2022-09-13T23:25:29.910" v="89" actId="164"/>
+          <ac:cxnSpMkLst>
+            <pc:docMk/>
+            <pc:sldMk cId="3962952338" sldId="3057"/>
+            <ac:cxnSpMk id="14" creationId="{343886A4-6C76-4DB8-8B76-EABDDBA707E0}"/>
+          </ac:cxnSpMkLst>
+        </pc:cxnChg>
+        <pc:cxnChg chg="add mod">
+          <ac:chgData name="Thomas O Fredericks" userId="9a40f032a9b16fc7" providerId="LiveId" clId="{E96FBD7B-6B81-4FE2-835E-0DB4EB96A5E5}" dt="2022-09-13T23:25:29.910" v="89" actId="164"/>
+          <ac:cxnSpMkLst>
+            <pc:docMk/>
+            <pc:sldMk cId="3962952338" sldId="3057"/>
+            <ac:cxnSpMk id="15" creationId="{4B97CB79-24FF-4137-8326-A01628172B57}"/>
+          </ac:cxnSpMkLst>
+        </pc:cxnChg>
+        <pc:cxnChg chg="add mod">
+          <ac:chgData name="Thomas O Fredericks" userId="9a40f032a9b16fc7" providerId="LiveId" clId="{E96FBD7B-6B81-4FE2-835E-0DB4EB96A5E5}" dt="2022-09-13T23:25:29.910" v="89" actId="164"/>
+          <ac:cxnSpMkLst>
+            <pc:docMk/>
+            <pc:sldMk cId="3962952338" sldId="3057"/>
+            <ac:cxnSpMk id="16" creationId="{FA6C34A3-79FE-406B-A7C4-E1781576C285}"/>
+          </ac:cxnSpMkLst>
+        </pc:cxnChg>
+      </pc:sldChg>
+      <pc:sldChg chg="delSp modSp add">
+        <pc:chgData name="Thomas O Fredericks" userId="9a40f032a9b16fc7" providerId="LiveId" clId="{E96FBD7B-6B81-4FE2-835E-0DB4EB96A5E5}" dt="2022-09-13T23:25:09.524" v="84" actId="1076"/>
+        <pc:sldMkLst>
+          <pc:docMk/>
+          <pc:sldMk cId="958468640" sldId="3058"/>
+        </pc:sldMkLst>
+        <pc:spChg chg="mod">
+          <ac:chgData name="Thomas O Fredericks" userId="9a40f032a9b16fc7" providerId="LiveId" clId="{E96FBD7B-6B81-4FE2-835E-0DB4EB96A5E5}" dt="2022-09-13T23:25:09.524" v="84" actId="1076"/>
+          <ac:spMkLst>
+            <pc:docMk/>
+            <pc:sldMk cId="958468640" sldId="3058"/>
+            <ac:spMk id="9" creationId="{D0B86496-3F0B-408E-A914-6B34EE4322B0}"/>
+          </ac:spMkLst>
+        </pc:spChg>
+        <pc:spChg chg="mod">
+          <ac:chgData name="Thomas O Fredericks" userId="9a40f032a9b16fc7" providerId="LiveId" clId="{E96FBD7B-6B81-4FE2-835E-0DB4EB96A5E5}" dt="2022-09-13T23:25:09.524" v="84" actId="1076"/>
+          <ac:spMkLst>
+            <pc:docMk/>
+            <pc:sldMk cId="958468640" sldId="3058"/>
+            <ac:spMk id="12" creationId="{63D854D8-E907-4FD6-BEF5-4F2885AA8EF5}"/>
+          </ac:spMkLst>
+        </pc:spChg>
+        <pc:spChg chg="mod">
+          <ac:chgData name="Thomas O Fredericks" userId="9a40f032a9b16fc7" providerId="LiveId" clId="{E96FBD7B-6B81-4FE2-835E-0DB4EB96A5E5}" dt="2022-09-13T23:25:09.524" v="84" actId="1076"/>
+          <ac:spMkLst>
+            <pc:docMk/>
+            <pc:sldMk cId="958468640" sldId="3058"/>
+            <ac:spMk id="15" creationId="{3CB409AA-A4E8-4A7D-B663-A1D3C8CB26CD}"/>
+          </ac:spMkLst>
+        </pc:spChg>
+        <pc:spChg chg="mod">
+          <ac:chgData name="Thomas O Fredericks" userId="9a40f032a9b16fc7" providerId="LiveId" clId="{E96FBD7B-6B81-4FE2-835E-0DB4EB96A5E5}" dt="2022-09-13T23:25:09.524" v="84" actId="1076"/>
+          <ac:spMkLst>
+            <pc:docMk/>
+            <pc:sldMk cId="958468640" sldId="3058"/>
+            <ac:spMk id="18" creationId="{007E2D7E-D926-43D7-82A5-624CE26E9319}"/>
+          </ac:spMkLst>
+        </pc:spChg>
+        <pc:spChg chg="mod">
+          <ac:chgData name="Thomas O Fredericks" userId="9a40f032a9b16fc7" providerId="LiveId" clId="{E96FBD7B-6B81-4FE2-835E-0DB4EB96A5E5}" dt="2022-09-13T23:25:09.524" v="84" actId="1076"/>
+          <ac:spMkLst>
+            <pc:docMk/>
+            <pc:sldMk cId="958468640" sldId="3058"/>
+            <ac:spMk id="23" creationId="{CCEB7A2D-C881-4867-9B46-D9F9AA091E2B}"/>
+          </ac:spMkLst>
+        </pc:spChg>
+        <pc:spChg chg="del">
+          <ac:chgData name="Thomas O Fredericks" userId="9a40f032a9b16fc7" providerId="LiveId" clId="{E96FBD7B-6B81-4FE2-835E-0DB4EB96A5E5}" dt="2022-09-13T23:21:15.766" v="38" actId="478"/>
+          <ac:spMkLst>
+            <pc:docMk/>
+            <pc:sldMk cId="958468640" sldId="3058"/>
+            <ac:spMk id="24" creationId="{4921856A-CEE8-4B8D-80E2-BFB3397D3F23}"/>
+          </ac:spMkLst>
+        </pc:spChg>
+        <pc:spChg chg="del">
+          <ac:chgData name="Thomas O Fredericks" userId="9a40f032a9b16fc7" providerId="LiveId" clId="{E96FBD7B-6B81-4FE2-835E-0DB4EB96A5E5}" dt="2022-09-13T23:21:22.733" v="40" actId="478"/>
+          <ac:spMkLst>
+            <pc:docMk/>
+            <pc:sldMk cId="958468640" sldId="3058"/>
+            <ac:spMk id="30" creationId="{82D66A4F-8A5F-49F0-B284-BF2893090C88}"/>
+          </ac:spMkLst>
+        </pc:spChg>
+        <pc:spChg chg="del">
+          <ac:chgData name="Thomas O Fredericks" userId="9a40f032a9b16fc7" providerId="LiveId" clId="{E96FBD7B-6B81-4FE2-835E-0DB4EB96A5E5}" dt="2022-09-13T23:22:12.223" v="49" actId="478"/>
+          <ac:spMkLst>
+            <pc:docMk/>
+            <pc:sldMk cId="958468640" sldId="3058"/>
+            <ac:spMk id="32" creationId="{D39F6767-85FF-41D8-A94F-A1907E5DFB17}"/>
+          </ac:spMkLst>
+        </pc:spChg>
+        <pc:spChg chg="del">
+          <ac:chgData name="Thomas O Fredericks" userId="9a40f032a9b16fc7" providerId="LiveId" clId="{E96FBD7B-6B81-4FE2-835E-0DB4EB96A5E5}" dt="2022-09-13T23:21:55.710" v="46" actId="478"/>
+          <ac:spMkLst>
+            <pc:docMk/>
+            <pc:sldMk cId="958468640" sldId="3058"/>
+            <ac:spMk id="33" creationId="{8C8D7E53-842A-46ED-9846-4B29B3C5EC99}"/>
+          </ac:spMkLst>
+        </pc:spChg>
+        <pc:spChg chg="del">
+          <ac:chgData name="Thomas O Fredericks" userId="9a40f032a9b16fc7" providerId="LiveId" clId="{E96FBD7B-6B81-4FE2-835E-0DB4EB96A5E5}" dt="2022-09-13T23:21:47.979" v="45" actId="478"/>
+          <ac:spMkLst>
+            <pc:docMk/>
+            <pc:sldMk cId="958468640" sldId="3058"/>
+            <ac:spMk id="35" creationId="{490A32CE-56FF-4E7C-9165-D6AFDD28B762}"/>
+          </ac:spMkLst>
+        </pc:spChg>
+        <pc:spChg chg="del">
+          <ac:chgData name="Thomas O Fredericks" userId="9a40f032a9b16fc7" providerId="LiveId" clId="{E96FBD7B-6B81-4FE2-835E-0DB4EB96A5E5}" dt="2022-09-13T23:21:57.798" v="47" actId="478"/>
+          <ac:spMkLst>
+            <pc:docMk/>
+            <pc:sldMk cId="958468640" sldId="3058"/>
+            <ac:spMk id="67" creationId="{384176A1-FDF1-4CCB-AFB0-7606CC82811B}"/>
+          </ac:spMkLst>
+        </pc:spChg>
+        <pc:spChg chg="mod">
+          <ac:chgData name="Thomas O Fredericks" userId="9a40f032a9b16fc7" providerId="LiveId" clId="{E96FBD7B-6B81-4FE2-835E-0DB4EB96A5E5}" dt="2022-09-13T23:25:09.524" v="84" actId="1076"/>
+          <ac:spMkLst>
+            <pc:docMk/>
+            <pc:sldMk cId="958468640" sldId="3058"/>
+            <ac:spMk id="68" creationId="{078C4111-2A88-40D8-AFFE-AC4A60F00E7F}"/>
+          </ac:spMkLst>
+        </pc:spChg>
+        <pc:spChg chg="del">
+          <ac:chgData name="Thomas O Fredericks" userId="9a40f032a9b16fc7" providerId="LiveId" clId="{E96FBD7B-6B81-4FE2-835E-0DB4EB96A5E5}" dt="2022-09-13T23:22:24.953" v="51" actId="478"/>
+          <ac:spMkLst>
+            <pc:docMk/>
+            <pc:sldMk cId="958468640" sldId="3058"/>
+            <ac:spMk id="69" creationId="{FE60C9BE-257A-40EC-9E64-E25780075D34}"/>
+          </ac:spMkLst>
+        </pc:spChg>
+        <pc:cxnChg chg="del mod">
+          <ac:chgData name="Thomas O Fredericks" userId="9a40f032a9b16fc7" providerId="LiveId" clId="{E96FBD7B-6B81-4FE2-835E-0DB4EB96A5E5}" dt="2022-09-13T23:21:24.843" v="41" actId="478"/>
+          <ac:cxnSpMkLst>
+            <pc:docMk/>
+            <pc:sldMk cId="958468640" sldId="3058"/>
+            <ac:cxnSpMk id="4" creationId="{FE8517B3-B2D3-4E7C-9E56-6F7CB4ACC28D}"/>
+          </ac:cxnSpMkLst>
+        </pc:cxnChg>
+        <pc:cxnChg chg="mod">
+          <ac:chgData name="Thomas O Fredericks" userId="9a40f032a9b16fc7" providerId="LiveId" clId="{E96FBD7B-6B81-4FE2-835E-0DB4EB96A5E5}" dt="2022-09-13T23:25:09.524" v="84" actId="1076"/>
+          <ac:cxnSpMkLst>
+            <pc:docMk/>
+            <pc:sldMk cId="958468640" sldId="3058"/>
+            <ac:cxnSpMk id="5" creationId="{09D8AB89-BDEE-426F-BD13-777BFD7CD1D0}"/>
+          </ac:cxnSpMkLst>
+        </pc:cxnChg>
+        <pc:cxnChg chg="mod">
+          <ac:chgData name="Thomas O Fredericks" userId="9a40f032a9b16fc7" providerId="LiveId" clId="{E96FBD7B-6B81-4FE2-835E-0DB4EB96A5E5}" dt="2022-09-13T23:25:09.524" v="84" actId="1076"/>
+          <ac:cxnSpMkLst>
+            <pc:docMk/>
+            <pc:sldMk cId="958468640" sldId="3058"/>
+            <ac:cxnSpMk id="8" creationId="{D6D4BCEC-8F8C-46A7-8936-CE1967BE75F8}"/>
+          </ac:cxnSpMkLst>
+        </pc:cxnChg>
+        <pc:cxnChg chg="mod">
+          <ac:chgData name="Thomas O Fredericks" userId="9a40f032a9b16fc7" providerId="LiveId" clId="{E96FBD7B-6B81-4FE2-835E-0DB4EB96A5E5}" dt="2022-09-13T23:25:09.524" v="84" actId="1076"/>
+          <ac:cxnSpMkLst>
+            <pc:docMk/>
+            <pc:sldMk cId="958468640" sldId="3058"/>
+            <ac:cxnSpMk id="13" creationId="{9B82D46E-A86F-49B6-B0F9-D5BCB6C94835}"/>
+          </ac:cxnSpMkLst>
+        </pc:cxnChg>
+        <pc:cxnChg chg="del mod">
+          <ac:chgData name="Thomas O Fredericks" userId="9a40f032a9b16fc7" providerId="LiveId" clId="{E96FBD7B-6B81-4FE2-835E-0DB4EB96A5E5}" dt="2022-09-13T23:21:17.603" v="39" actId="478"/>
+          <ac:cxnSpMkLst>
+            <pc:docMk/>
+            <pc:sldMk cId="958468640" sldId="3058"/>
+            <ac:cxnSpMk id="16" creationId="{190E9A05-6F57-4594-9B5D-51CCBD181BD4}"/>
+          </ac:cxnSpMkLst>
+        </pc:cxnChg>
+        <pc:cxnChg chg="del mod">
+          <ac:chgData name="Thomas O Fredericks" userId="9a40f032a9b16fc7" providerId="LiveId" clId="{E96FBD7B-6B81-4FE2-835E-0DB4EB96A5E5}" dt="2022-09-13T23:22:26.743" v="52" actId="478"/>
+          <ac:cxnSpMkLst>
+            <pc:docMk/>
+            <pc:sldMk cId="958468640" sldId="3058"/>
+            <ac:cxnSpMk id="39" creationId="{95D20A08-83BD-409D-A678-0C3F8074FA05}"/>
+          </ac:cxnSpMkLst>
+        </pc:cxnChg>
+        <pc:cxnChg chg="del mod">
+          <ac:chgData name="Thomas O Fredericks" userId="9a40f032a9b16fc7" providerId="LiveId" clId="{E96FBD7B-6B81-4FE2-835E-0DB4EB96A5E5}" dt="2022-09-13T23:22:05.926" v="48" actId="478"/>
+          <ac:cxnSpMkLst>
+            <pc:docMk/>
+            <pc:sldMk cId="958468640" sldId="3058"/>
+            <ac:cxnSpMk id="48" creationId="{A436105C-05E8-4723-86E3-7A2C8438854F}"/>
+          </ac:cxnSpMkLst>
+        </pc:cxnChg>
+        <pc:cxnChg chg="del mod">
+          <ac:chgData name="Thomas O Fredericks" userId="9a40f032a9b16fc7" providerId="LiveId" clId="{E96FBD7B-6B81-4FE2-835E-0DB4EB96A5E5}" dt="2022-09-13T23:24:58.496" v="83" actId="478"/>
+          <ac:cxnSpMkLst>
+            <pc:docMk/>
+            <pc:sldMk cId="958468640" sldId="3058"/>
+            <ac:cxnSpMk id="51" creationId="{7348BDD4-0B99-493C-B0F9-0E3998C5F7D8}"/>
+          </ac:cxnSpMkLst>
+        </pc:cxnChg>
+        <pc:cxnChg chg="mod">
+          <ac:chgData name="Thomas O Fredericks" userId="9a40f032a9b16fc7" providerId="LiveId" clId="{E96FBD7B-6B81-4FE2-835E-0DB4EB96A5E5}" dt="2022-09-13T23:25:09.524" v="84" actId="1076"/>
+          <ac:cxnSpMkLst>
+            <pc:docMk/>
+            <pc:sldMk cId="958468640" sldId="3058"/>
+            <ac:cxnSpMk id="63" creationId="{D8764911-17E8-4573-9491-2EC1174737D8}"/>
+          </ac:cxnSpMkLst>
+        </pc:cxnChg>
+        <pc:cxnChg chg="mod">
+          <ac:chgData name="Thomas O Fredericks" userId="9a40f032a9b16fc7" providerId="LiveId" clId="{E96FBD7B-6B81-4FE2-835E-0DB4EB96A5E5}" dt="2022-09-13T23:25:09.524" v="84" actId="1076"/>
+          <ac:cxnSpMkLst>
+            <pc:docMk/>
+            <pc:sldMk cId="958468640" sldId="3058"/>
+            <ac:cxnSpMk id="65" creationId="{9B54337D-1F68-417F-B06E-FFD67F1B050B}"/>
+          </ac:cxnSpMkLst>
+        </pc:cxnChg>
+      </pc:sldChg>
+    </pc:docChg>
+  </pc:docChgLst>
   <pc:docChgLst>
     <pc:chgData name="Thomas O Fredericks" userId="9a40f032a9b16fc7" providerId="LiveId" clId="{0070C532-8D39-4810-9AFC-FBE77E81F1D7}"/>
     <pc:docChg chg="custSel addSld delSld modSld">
@@ -317,7 +645,7 @@
           <a:p>
             <a:fld id="{DCDD5F17-F228-4C32-BB08-C02CB1CDA8CD}" type="datetimeFigureOut">
               <a:rPr lang="fr-CA" smtClean="0"/>
-              <a:t>2022-09-12</a:t>
+              <a:t>2022-09-13</a:t>
             </a:fld>
             <a:endParaRPr lang="fr-CA"/>
           </a:p>
@@ -517,7 +845,7 @@
           <a:p>
             <a:fld id="{DCDD5F17-F228-4C32-BB08-C02CB1CDA8CD}" type="datetimeFigureOut">
               <a:rPr lang="fr-CA" smtClean="0"/>
-              <a:t>2022-09-12</a:t>
+              <a:t>2022-09-13</a:t>
             </a:fld>
             <a:endParaRPr lang="fr-CA"/>
           </a:p>
@@ -727,7 +1055,7 @@
           <a:p>
             <a:fld id="{DCDD5F17-F228-4C32-BB08-C02CB1CDA8CD}" type="datetimeFigureOut">
               <a:rPr lang="fr-CA" smtClean="0"/>
-              <a:t>2022-09-12</a:t>
+              <a:t>2022-09-13</a:t>
             </a:fld>
             <a:endParaRPr lang="fr-CA"/>
           </a:p>
@@ -1024,7 +1352,7 @@
           <a:p>
             <a:fld id="{DCDD5F17-F228-4C32-BB08-C02CB1CDA8CD}" type="datetimeFigureOut">
               <a:rPr lang="fr-CA" smtClean="0"/>
-              <a:t>2022-09-12</a:t>
+              <a:t>2022-09-13</a:t>
             </a:fld>
             <a:endParaRPr lang="fr-CA"/>
           </a:p>
@@ -1300,7 +1628,7 @@
           <a:p>
             <a:fld id="{DCDD5F17-F228-4C32-BB08-C02CB1CDA8CD}" type="datetimeFigureOut">
               <a:rPr lang="fr-CA" smtClean="0"/>
-              <a:t>2022-09-12</a:t>
+              <a:t>2022-09-13</a:t>
             </a:fld>
             <a:endParaRPr lang="fr-CA"/>
           </a:p>
@@ -1568,7 +1896,7 @@
           <a:p>
             <a:fld id="{DCDD5F17-F228-4C32-BB08-C02CB1CDA8CD}" type="datetimeFigureOut">
               <a:rPr lang="fr-CA" smtClean="0"/>
-              <a:t>2022-09-12</a:t>
+              <a:t>2022-09-13</a:t>
             </a:fld>
             <a:endParaRPr lang="fr-CA"/>
           </a:p>
@@ -1983,7 +2311,7 @@
           <a:p>
             <a:fld id="{DCDD5F17-F228-4C32-BB08-C02CB1CDA8CD}" type="datetimeFigureOut">
               <a:rPr lang="fr-CA" smtClean="0"/>
-              <a:t>2022-09-12</a:t>
+              <a:t>2022-09-13</a:t>
             </a:fld>
             <a:endParaRPr lang="fr-CA"/>
           </a:p>
@@ -2125,7 +2453,7 @@
           <a:p>
             <a:fld id="{DCDD5F17-F228-4C32-BB08-C02CB1CDA8CD}" type="datetimeFigureOut">
               <a:rPr lang="fr-CA" smtClean="0"/>
-              <a:t>2022-09-12</a:t>
+              <a:t>2022-09-13</a:t>
             </a:fld>
             <a:endParaRPr lang="fr-CA"/>
           </a:p>
@@ -2238,7 +2566,7 @@
           <a:p>
             <a:fld id="{DCDD5F17-F228-4C32-BB08-C02CB1CDA8CD}" type="datetimeFigureOut">
               <a:rPr lang="fr-CA" smtClean="0"/>
-              <a:t>2022-09-12</a:t>
+              <a:t>2022-09-13</a:t>
             </a:fld>
             <a:endParaRPr lang="fr-CA"/>
           </a:p>
@@ -2551,7 +2879,7 @@
           <a:p>
             <a:fld id="{DCDD5F17-F228-4C32-BB08-C02CB1CDA8CD}" type="datetimeFigureOut">
               <a:rPr lang="fr-CA" smtClean="0"/>
-              <a:t>2022-09-12</a:t>
+              <a:t>2022-09-13</a:t>
             </a:fld>
             <a:endParaRPr lang="fr-CA"/>
           </a:p>
@@ -2840,7 +3168,7 @@
           <a:p>
             <a:fld id="{DCDD5F17-F228-4C32-BB08-C02CB1CDA8CD}" type="datetimeFigureOut">
               <a:rPr lang="fr-CA" smtClean="0"/>
-              <a:t>2022-09-12</a:t>
+              <a:t>2022-09-13</a:t>
             </a:fld>
             <a:endParaRPr lang="fr-CA"/>
           </a:p>
@@ -3083,7 +3411,7 @@
           <a:p>
             <a:fld id="{DCDD5F17-F228-4C32-BB08-C02CB1CDA8CD}" type="datetimeFigureOut">
               <a:rPr lang="fr-CA" smtClean="0"/>
-              <a:t>2022-09-12</a:t>
+              <a:t>2022-09-13</a:t>
             </a:fld>
             <a:endParaRPr lang="fr-CA"/>
           </a:p>
@@ -3501,69 +3829,6 @@
           <a:chExt cx="0" cy="0"/>
         </a:xfrm>
       </p:grpSpPr>
-      <p:sp>
-        <p:nvSpPr>
-          <p:cNvPr id="7" name="Titre 6">
-            <a:extLst>
-              <a:ext uri="{FF2B5EF4-FFF2-40B4-BE49-F238E27FC236}">
-                <a16:creationId xmlns:a16="http://schemas.microsoft.com/office/drawing/2014/main" id="{42C10F38-8247-4F6E-B365-EB0CBA01584C}"/>
-              </a:ext>
-            </a:extLst>
-          </p:cNvPr>
-          <p:cNvSpPr>
-            <a:spLocks noGrp="1"/>
-          </p:cNvSpPr>
-          <p:nvPr>
-            <p:ph type="title"/>
-          </p:nvPr>
-        </p:nvSpPr>
-        <p:spPr>
-          <a:xfrm>
-            <a:off x="838199" y="373506"/>
-            <a:ext cx="4510481" cy="6179693"/>
-          </a:xfrm>
-        </p:spPr>
-        <p:txBody>
-          <a:bodyPr anchor="ctr">
-            <a:normAutofit/>
-          </a:bodyPr>
-          <a:lstStyle/>
-          <a:p>
-            <a:r>
-              <a:rPr lang="fr-CA" dirty="0"/>
-              <a:t>PROGRAMMER </a:t>
-            </a:r>
-            <a:r>
-              <a:rPr lang="fr-CA" dirty="0">
-                <a:solidFill>
-                  <a:schemeClr val="accent6"/>
-                </a:solidFill>
-              </a:rPr>
-              <a:t>ARDUINO</a:t>
-            </a:r>
-            <a:r>
-              <a:rPr lang="fr-CA" dirty="0"/>
-              <a:t> :  ENVOYER LA VALEUR DE L’INTERRUPTEUR </a:t>
-            </a:r>
-            <a:r>
-              <a:rPr lang="fr-CA" dirty="0">
-                <a:solidFill>
-                  <a:schemeClr val="accent2"/>
-                </a:solidFill>
-              </a:rPr>
-              <a:t>SEULEMENT LORSQUE LA VALEUR CHANGE</a:t>
-            </a:r>
-            <a:r>
-              <a:rPr lang="fr-CA" dirty="0"/>
-              <a:t>!</a:t>
-            </a:r>
-            <a:br>
-              <a:rPr lang="fr-CA" dirty="0"/>
-            </a:br>
-            <a:endParaRPr lang="fr-CA" dirty="0"/>
-          </a:p>
-        </p:txBody>
-      </p:sp>
       <p:pic>
         <p:nvPicPr>
           <p:cNvPr id="5" name="Image 4">
@@ -3586,7 +3851,7 @@
         </p:blipFill>
         <p:spPr>
           <a:xfrm>
-            <a:off x="5421641" y="1037713"/>
+            <a:off x="5833131" y="1037713"/>
             <a:ext cx="5932160" cy="4782574"/>
           </a:xfrm>
           <a:prstGeom prst="rect">
@@ -3599,6 +3864,554 @@
           </a:ln>
         </p:spPr>
       </p:pic>
+      <p:grpSp>
+        <p:nvGrpSpPr>
+          <p:cNvPr id="4" name="Groupe 3">
+            <a:extLst>
+              <a:ext uri="{FF2B5EF4-FFF2-40B4-BE49-F238E27FC236}">
+                <a16:creationId xmlns:a16="http://schemas.microsoft.com/office/drawing/2014/main" id="{00DD97B2-80E9-44BC-981B-CD7333EDCA3A}"/>
+              </a:ext>
+            </a:extLst>
+          </p:cNvPr>
+          <p:cNvGrpSpPr/>
+          <p:nvPr/>
+        </p:nvGrpSpPr>
+        <p:grpSpPr>
+          <a:xfrm>
+            <a:off x="426709" y="2219879"/>
+            <a:ext cx="4763193" cy="2710124"/>
+            <a:chOff x="578125" y="1534124"/>
+            <a:chExt cx="5975678" cy="3399995"/>
+          </a:xfrm>
+        </p:grpSpPr>
+        <p:sp>
+          <p:nvSpPr>
+            <p:cNvPr id="6" name="Rectangle 5">
+              <a:extLst>
+                <a:ext uri="{FF2B5EF4-FFF2-40B4-BE49-F238E27FC236}">
+                  <a16:creationId xmlns:a16="http://schemas.microsoft.com/office/drawing/2014/main" id="{6A688945-F493-4AB4-8208-BC2ECA1DEA6E}"/>
+                </a:ext>
+              </a:extLst>
+            </p:cNvPr>
+            <p:cNvSpPr/>
+            <p:nvPr/>
+          </p:nvSpPr>
+          <p:spPr>
+            <a:xfrm>
+              <a:off x="769306" y="1534124"/>
+              <a:ext cx="2173399" cy="656706"/>
+            </a:xfrm>
+            <a:prstGeom prst="rect">
+              <a:avLst/>
+            </a:prstGeom>
+            <a:solidFill>
+              <a:schemeClr val="accent5"/>
+            </a:solidFill>
+            <a:ln>
+              <a:solidFill>
+                <a:schemeClr val="accent5"/>
+              </a:solidFill>
+            </a:ln>
+          </p:spPr>
+          <p:style>
+            <a:lnRef idx="2">
+              <a:schemeClr val="accent1">
+                <a:shade val="50000"/>
+              </a:schemeClr>
+            </a:lnRef>
+            <a:fillRef idx="1">
+              <a:schemeClr val="accent1"/>
+            </a:fillRef>
+            <a:effectRef idx="0">
+              <a:schemeClr val="accent1"/>
+            </a:effectRef>
+            <a:fontRef idx="minor">
+              <a:schemeClr val="lt1"/>
+            </a:fontRef>
+          </p:style>
+          <p:txBody>
+            <a:bodyPr rtlCol="0" anchor="ctr"/>
+            <a:lstStyle/>
+            <a:p>
+              <a:pPr algn="ctr"/>
+              <a:r>
+                <a:rPr lang="fr-CA" sz="1200" dirty="0" err="1"/>
+                <a:t>loop</a:t>
+              </a:r>
+              <a:r>
+                <a:rPr lang="fr-CA" sz="1200" dirty="0"/>
+                <a:t>( )</a:t>
+              </a:r>
+            </a:p>
+          </p:txBody>
+        </p:sp>
+        <p:sp>
+          <p:nvSpPr>
+            <p:cNvPr id="8" name="Losange 7">
+              <a:extLst>
+                <a:ext uri="{FF2B5EF4-FFF2-40B4-BE49-F238E27FC236}">
+                  <a16:creationId xmlns:a16="http://schemas.microsoft.com/office/drawing/2014/main" id="{A13355A9-ED22-4033-B46E-C18B09750D73}"/>
+                </a:ext>
+              </a:extLst>
+            </p:cNvPr>
+            <p:cNvSpPr/>
+            <p:nvPr/>
+          </p:nvSpPr>
+          <p:spPr>
+            <a:xfrm>
+              <a:off x="578125" y="2523778"/>
+              <a:ext cx="2555762" cy="1810444"/>
+            </a:xfrm>
+            <a:prstGeom prst="diamond">
+              <a:avLst/>
+            </a:prstGeom>
+            <a:solidFill>
+              <a:schemeClr val="accent5"/>
+            </a:solidFill>
+            <a:ln>
+              <a:solidFill>
+                <a:schemeClr val="accent5"/>
+              </a:solidFill>
+            </a:ln>
+          </p:spPr>
+          <p:style>
+            <a:lnRef idx="2">
+              <a:schemeClr val="accent1">
+                <a:shade val="50000"/>
+              </a:schemeClr>
+            </a:lnRef>
+            <a:fillRef idx="1">
+              <a:schemeClr val="accent1"/>
+            </a:fillRef>
+            <a:effectRef idx="0">
+              <a:schemeClr val="accent1"/>
+            </a:effectRef>
+            <a:fontRef idx="minor">
+              <a:schemeClr val="lt1"/>
+            </a:fontRef>
+          </p:style>
+          <p:txBody>
+            <a:bodyPr rtlCol="0" anchor="ctr"/>
+            <a:lstStyle/>
+            <a:p>
+              <a:pPr algn="ctr"/>
+              <a:r>
+                <a:rPr lang="fr-CA" sz="1200" dirty="0"/>
+                <a:t>Est-ce que l’état de l’interrupteur a changé?</a:t>
+              </a:r>
+            </a:p>
+          </p:txBody>
+        </p:sp>
+        <p:cxnSp>
+          <p:nvCxnSpPr>
+            <p:cNvPr id="9" name="Connecteur droit avec flèche 8">
+              <a:extLst>
+                <a:ext uri="{FF2B5EF4-FFF2-40B4-BE49-F238E27FC236}">
+                  <a16:creationId xmlns:a16="http://schemas.microsoft.com/office/drawing/2014/main" id="{4D7F3A33-2325-4B38-A97E-6AEB14A975C2}"/>
+                </a:ext>
+              </a:extLst>
+            </p:cNvPr>
+            <p:cNvCxnSpPr>
+              <a:cxnSpLocks/>
+              <a:stCxn id="6" idx="2"/>
+            </p:cNvCxnSpPr>
+            <p:nvPr/>
+          </p:nvCxnSpPr>
+          <p:spPr>
+            <a:xfrm flipH="1">
+              <a:off x="1856005" y="2190830"/>
+              <a:ext cx="1" cy="295276"/>
+            </a:xfrm>
+            <a:prstGeom prst="straightConnector1">
+              <a:avLst/>
+            </a:prstGeom>
+            <a:ln>
+              <a:tailEnd type="triangle"/>
+            </a:ln>
+          </p:spPr>
+          <p:style>
+            <a:lnRef idx="1">
+              <a:schemeClr val="accent1"/>
+            </a:lnRef>
+            <a:fillRef idx="0">
+              <a:schemeClr val="accent1"/>
+            </a:fillRef>
+            <a:effectRef idx="0">
+              <a:schemeClr val="accent1"/>
+            </a:effectRef>
+            <a:fontRef idx="minor">
+              <a:schemeClr val="tx1"/>
+            </a:fontRef>
+          </p:style>
+        </p:cxnSp>
+        <p:sp>
+          <p:nvSpPr>
+            <p:cNvPr id="10" name="Rectangle 9">
+              <a:extLst>
+                <a:ext uri="{FF2B5EF4-FFF2-40B4-BE49-F238E27FC236}">
+                  <a16:creationId xmlns:a16="http://schemas.microsoft.com/office/drawing/2014/main" id="{D105EDFE-ECA6-4C14-83AF-C74CF5867C21}"/>
+                </a:ext>
+              </a:extLst>
+            </p:cNvPr>
+            <p:cNvSpPr/>
+            <p:nvPr/>
+          </p:nvSpPr>
+          <p:spPr>
+            <a:xfrm>
+              <a:off x="4380404" y="2957557"/>
+              <a:ext cx="2173399" cy="942887"/>
+            </a:xfrm>
+            <a:prstGeom prst="rect">
+              <a:avLst/>
+            </a:prstGeom>
+            <a:solidFill>
+              <a:schemeClr val="accent5"/>
+            </a:solidFill>
+            <a:ln>
+              <a:solidFill>
+                <a:schemeClr val="accent5"/>
+              </a:solidFill>
+            </a:ln>
+          </p:spPr>
+          <p:style>
+            <a:lnRef idx="2">
+              <a:schemeClr val="accent1">
+                <a:shade val="50000"/>
+              </a:schemeClr>
+            </a:lnRef>
+            <a:fillRef idx="1">
+              <a:schemeClr val="accent1"/>
+            </a:fillRef>
+            <a:effectRef idx="0">
+              <a:schemeClr val="accent1"/>
+            </a:effectRef>
+            <a:fontRef idx="minor">
+              <a:schemeClr val="lt1"/>
+            </a:fontRef>
+          </p:style>
+          <p:txBody>
+            <a:bodyPr rtlCol="0" anchor="ctr"/>
+            <a:lstStyle/>
+            <a:p>
+              <a:pPr algn="ctr"/>
+              <a:r>
+                <a:rPr lang="fr-CA" sz="1200" dirty="0"/>
+                <a:t>Envoyer la valeur de l’interrupteur</a:t>
+              </a:r>
+            </a:p>
+          </p:txBody>
+        </p:sp>
+        <p:cxnSp>
+          <p:nvCxnSpPr>
+            <p:cNvPr id="11" name="Connecteur droit avec flèche 10">
+              <a:extLst>
+                <a:ext uri="{FF2B5EF4-FFF2-40B4-BE49-F238E27FC236}">
+                  <a16:creationId xmlns:a16="http://schemas.microsoft.com/office/drawing/2014/main" id="{25010A16-40AD-43E0-A3CB-D56B07615C07}"/>
+                </a:ext>
+              </a:extLst>
+            </p:cNvPr>
+            <p:cNvCxnSpPr>
+              <a:cxnSpLocks/>
+              <a:stCxn id="8" idx="3"/>
+              <a:endCxn id="10" idx="1"/>
+            </p:cNvCxnSpPr>
+            <p:nvPr/>
+          </p:nvCxnSpPr>
+          <p:spPr>
+            <a:xfrm>
+              <a:off x="3133887" y="3429000"/>
+              <a:ext cx="1246517" cy="1"/>
+            </a:xfrm>
+            <a:prstGeom prst="straightConnector1">
+              <a:avLst/>
+            </a:prstGeom>
+            <a:ln>
+              <a:tailEnd type="triangle"/>
+            </a:ln>
+          </p:spPr>
+          <p:style>
+            <a:lnRef idx="1">
+              <a:schemeClr val="accent1"/>
+            </a:lnRef>
+            <a:fillRef idx="0">
+              <a:schemeClr val="accent1"/>
+            </a:fillRef>
+            <a:effectRef idx="0">
+              <a:schemeClr val="accent1"/>
+            </a:effectRef>
+            <a:fontRef idx="minor">
+              <a:schemeClr val="tx1"/>
+            </a:fontRef>
+          </p:style>
+        </p:cxnSp>
+        <p:sp>
+          <p:nvSpPr>
+            <p:cNvPr id="12" name="ZoneTexte 11">
+              <a:extLst>
+                <a:ext uri="{FF2B5EF4-FFF2-40B4-BE49-F238E27FC236}">
+                  <a16:creationId xmlns:a16="http://schemas.microsoft.com/office/drawing/2014/main" id="{2B582A2C-D423-4D6D-BC16-9EDBC7DB9CFE}"/>
+                </a:ext>
+              </a:extLst>
+            </p:cNvPr>
+            <p:cNvSpPr txBox="1"/>
+            <p:nvPr/>
+          </p:nvSpPr>
+          <p:spPr>
+            <a:xfrm>
+              <a:off x="3394603" y="3428999"/>
+              <a:ext cx="565265" cy="312887"/>
+            </a:xfrm>
+            <a:prstGeom prst="rect">
+              <a:avLst/>
+            </a:prstGeom>
+            <a:noFill/>
+          </p:spPr>
+          <p:txBody>
+            <a:bodyPr wrap="square" rtlCol="0">
+              <a:spAutoFit/>
+            </a:bodyPr>
+            <a:lstStyle/>
+            <a:p>
+              <a:pPr algn="ctr"/>
+              <a:r>
+                <a:rPr lang="fr-CA" sz="1200" dirty="0"/>
+                <a:t>oui</a:t>
+              </a:r>
+            </a:p>
+          </p:txBody>
+        </p:sp>
+        <p:sp>
+          <p:nvSpPr>
+            <p:cNvPr id="13" name="Rectangle 12">
+              <a:extLst>
+                <a:ext uri="{FF2B5EF4-FFF2-40B4-BE49-F238E27FC236}">
+                  <a16:creationId xmlns:a16="http://schemas.microsoft.com/office/drawing/2014/main" id="{24F84985-5477-471E-AB07-635CB3C28EE7}"/>
+                </a:ext>
+              </a:extLst>
+            </p:cNvPr>
+            <p:cNvSpPr/>
+            <p:nvPr/>
+          </p:nvSpPr>
+          <p:spPr>
+            <a:xfrm>
+              <a:off x="4380403" y="3980762"/>
+              <a:ext cx="2173399" cy="917466"/>
+            </a:xfrm>
+            <a:prstGeom prst="rect">
+              <a:avLst/>
+            </a:prstGeom>
+            <a:solidFill>
+              <a:schemeClr val="accent5"/>
+            </a:solidFill>
+            <a:ln>
+              <a:solidFill>
+                <a:schemeClr val="accent5"/>
+              </a:solidFill>
+            </a:ln>
+          </p:spPr>
+          <p:style>
+            <a:lnRef idx="2">
+              <a:schemeClr val="accent1">
+                <a:shade val="50000"/>
+              </a:schemeClr>
+            </a:lnRef>
+            <a:fillRef idx="1">
+              <a:schemeClr val="accent1"/>
+            </a:fillRef>
+            <a:effectRef idx="0">
+              <a:schemeClr val="accent1"/>
+            </a:effectRef>
+            <a:fontRef idx="minor">
+              <a:schemeClr val="lt1"/>
+            </a:fontRef>
+          </p:style>
+          <p:txBody>
+            <a:bodyPr rtlCol="0" anchor="ctr"/>
+            <a:lstStyle/>
+            <a:p>
+              <a:pPr algn="ctr"/>
+              <a:r>
+                <a:rPr lang="fr-CA" sz="1200" dirty="0"/>
+                <a:t>Mettre en mémoire la valeur de l’interrupteur</a:t>
+              </a:r>
+            </a:p>
+          </p:txBody>
+        </p:sp>
+        <p:cxnSp>
+          <p:nvCxnSpPr>
+            <p:cNvPr id="14" name="Connecteur : en angle 13">
+              <a:extLst>
+                <a:ext uri="{FF2B5EF4-FFF2-40B4-BE49-F238E27FC236}">
+                  <a16:creationId xmlns:a16="http://schemas.microsoft.com/office/drawing/2014/main" id="{343886A4-6C76-4DB8-8B76-EABDDBA707E0}"/>
+                </a:ext>
+              </a:extLst>
+            </p:cNvPr>
+            <p:cNvCxnSpPr>
+              <a:cxnSpLocks/>
+              <a:stCxn id="10" idx="2"/>
+              <a:endCxn id="13" idx="0"/>
+            </p:cNvCxnSpPr>
+            <p:nvPr/>
+          </p:nvCxnSpPr>
+          <p:spPr>
+            <a:xfrm rot="5400000">
+              <a:off x="5426945" y="3940603"/>
+              <a:ext cx="80318" cy="1"/>
+            </a:xfrm>
+            <a:prstGeom prst="bentConnector3">
+              <a:avLst>
+                <a:gd name="adj1" fmla="val 50000"/>
+              </a:avLst>
+            </a:prstGeom>
+            <a:ln>
+              <a:tailEnd type="triangle"/>
+            </a:ln>
+          </p:spPr>
+          <p:style>
+            <a:lnRef idx="1">
+              <a:schemeClr val="accent1"/>
+            </a:lnRef>
+            <a:fillRef idx="0">
+              <a:schemeClr val="accent1"/>
+            </a:fillRef>
+            <a:effectRef idx="0">
+              <a:schemeClr val="accent1"/>
+            </a:effectRef>
+            <a:fontRef idx="minor">
+              <a:schemeClr val="tx1"/>
+            </a:fontRef>
+          </p:style>
+        </p:cxnSp>
+        <p:cxnSp>
+          <p:nvCxnSpPr>
+            <p:cNvPr id="15" name="Connecteur : en angle 14">
+              <a:extLst>
+                <a:ext uri="{FF2B5EF4-FFF2-40B4-BE49-F238E27FC236}">
+                  <a16:creationId xmlns:a16="http://schemas.microsoft.com/office/drawing/2014/main" id="{4B97CB79-24FF-4137-8326-A01628172B57}"/>
+                </a:ext>
+              </a:extLst>
+            </p:cNvPr>
+            <p:cNvCxnSpPr>
+              <a:cxnSpLocks/>
+              <a:stCxn id="8" idx="2"/>
+              <a:endCxn id="6" idx="1"/>
+            </p:cNvCxnSpPr>
+            <p:nvPr/>
+          </p:nvCxnSpPr>
+          <p:spPr>
+            <a:xfrm rot="5400000" flipH="1">
+              <a:off x="76783" y="2555000"/>
+              <a:ext cx="2471745" cy="1086700"/>
+            </a:xfrm>
+            <a:prstGeom prst="bentConnector4">
+              <a:avLst>
+                <a:gd name="adj1" fmla="val -9249"/>
+                <a:gd name="adj2" fmla="val 138629"/>
+              </a:avLst>
+            </a:prstGeom>
+            <a:ln>
+              <a:tailEnd type="triangle"/>
+            </a:ln>
+          </p:spPr>
+          <p:style>
+            <a:lnRef idx="1">
+              <a:schemeClr val="accent1"/>
+            </a:lnRef>
+            <a:fillRef idx="0">
+              <a:schemeClr val="accent1"/>
+            </a:fillRef>
+            <a:effectRef idx="0">
+              <a:schemeClr val="accent1"/>
+            </a:effectRef>
+            <a:fontRef idx="minor">
+              <a:schemeClr val="tx1"/>
+            </a:fontRef>
+          </p:style>
+        </p:cxnSp>
+        <p:cxnSp>
+          <p:nvCxnSpPr>
+            <p:cNvPr id="16" name="Connecteur : en angle 15">
+              <a:extLst>
+                <a:ext uri="{FF2B5EF4-FFF2-40B4-BE49-F238E27FC236}">
+                  <a16:creationId xmlns:a16="http://schemas.microsoft.com/office/drawing/2014/main" id="{FA6C34A3-79FE-406B-A7C4-E1781576C285}"/>
+                </a:ext>
+              </a:extLst>
+            </p:cNvPr>
+            <p:cNvCxnSpPr>
+              <a:cxnSpLocks/>
+              <a:stCxn id="13" idx="2"/>
+              <a:endCxn id="6" idx="0"/>
+            </p:cNvCxnSpPr>
+            <p:nvPr/>
+          </p:nvCxnSpPr>
+          <p:spPr>
+            <a:xfrm rot="5400000" flipH="1">
+              <a:off x="1979503" y="1410628"/>
+              <a:ext cx="3364104" cy="3611097"/>
+            </a:xfrm>
+            <a:prstGeom prst="bentConnector5">
+              <a:avLst>
+                <a:gd name="adj1" fmla="val -6795"/>
+                <a:gd name="adj2" fmla="val -37936"/>
+                <a:gd name="adj3" fmla="val 106795"/>
+              </a:avLst>
+            </a:prstGeom>
+            <a:ln>
+              <a:tailEnd type="triangle"/>
+            </a:ln>
+          </p:spPr>
+          <p:style>
+            <a:lnRef idx="1">
+              <a:schemeClr val="accent1"/>
+            </a:lnRef>
+            <a:fillRef idx="0">
+              <a:schemeClr val="accent1"/>
+            </a:fillRef>
+            <a:effectRef idx="0">
+              <a:schemeClr val="accent1"/>
+            </a:effectRef>
+            <a:fontRef idx="minor">
+              <a:schemeClr val="tx1"/>
+            </a:fontRef>
+          </p:style>
+        </p:cxnSp>
+        <p:sp>
+          <p:nvSpPr>
+            <p:cNvPr id="17" name="ZoneTexte 16">
+              <a:extLst>
+                <a:ext uri="{FF2B5EF4-FFF2-40B4-BE49-F238E27FC236}">
+                  <a16:creationId xmlns:a16="http://schemas.microsoft.com/office/drawing/2014/main" id="{6032D1AB-788F-4459-8A14-DFC1A0CD6CF5}"/>
+                </a:ext>
+              </a:extLst>
+            </p:cNvPr>
+            <p:cNvSpPr txBox="1"/>
+            <p:nvPr/>
+          </p:nvSpPr>
+          <p:spPr>
+            <a:xfrm>
+              <a:off x="1515182" y="4621232"/>
+              <a:ext cx="565265" cy="312887"/>
+            </a:xfrm>
+            <a:prstGeom prst="rect">
+              <a:avLst/>
+            </a:prstGeom>
+            <a:noFill/>
+          </p:spPr>
+          <p:txBody>
+            <a:bodyPr wrap="square" rtlCol="0">
+              <a:spAutoFit/>
+            </a:bodyPr>
+            <a:lstStyle/>
+            <a:p>
+              <a:pPr algn="ctr"/>
+              <a:r>
+                <a:rPr lang="fr-CA" sz="1200" dirty="0"/>
+                <a:t>non</a:t>
+              </a:r>
+            </a:p>
+          </p:txBody>
+        </p:sp>
+      </p:grpSp>
     </p:spTree>
     <p:extLst>
       <p:ext uri="{BB962C8B-B14F-4D97-AF65-F5344CB8AC3E}">
@@ -3645,7 +4458,12 @@
             <p:ph type="title"/>
           </p:nvPr>
         </p:nvSpPr>
-        <p:spPr/>
+        <p:spPr>
+          <a:xfrm>
+            <a:off x="838200" y="365125"/>
+            <a:ext cx="10515600" cy="702869"/>
+          </a:xfrm>
+        </p:spPr>
         <p:txBody>
           <a:bodyPr>
             <a:normAutofit/>
@@ -3653,138 +4471,41 @@
           <a:lstStyle/>
           <a:p>
             <a:r>
-              <a:rPr lang="en-CA" sz="2800" dirty="0"/>
-              <a:t>CODER LA DÉTECTION DE CHANGEMENT D’ÉTAT</a:t>
-            </a:r>
-            <a:endParaRPr lang="fr-CA" sz="2800" dirty="0"/>
-          </a:p>
-        </p:txBody>
-      </p:sp>
-      <p:sp>
-        <p:nvSpPr>
-          <p:cNvPr id="20" name="ZoneTexte 19">
-            <a:extLst>
-              <a:ext uri="{FF2B5EF4-FFF2-40B4-BE49-F238E27FC236}">
-                <a16:creationId xmlns:a16="http://schemas.microsoft.com/office/drawing/2014/main" id="{C75052FA-19EF-4A88-BB95-05B39DAA1B2F}"/>
-              </a:ext>
-            </a:extLst>
-          </p:cNvPr>
-          <p:cNvSpPr txBox="1"/>
+              <a:rPr lang="en-CA" sz="2400" dirty="0"/>
+              <a:t>CODER LA DÉTECTION DE CHANGEMENT D’ÉTAT : GRAPHE</a:t>
+            </a:r>
+            <a:endParaRPr lang="fr-CA" sz="2400" dirty="0"/>
+          </a:p>
+        </p:txBody>
+      </p:sp>
+      <p:sp>
+        <p:nvSpPr>
+          <p:cNvPr id="12" name="Rectangle 11">
+            <a:extLst>
+              <a:ext uri="{FF2B5EF4-FFF2-40B4-BE49-F238E27FC236}">
+                <a16:creationId xmlns:a16="http://schemas.microsoft.com/office/drawing/2014/main" id="{63D854D8-E907-4FD6-BEF5-4F2885AA8EF5}"/>
+              </a:ext>
+            </a:extLst>
+          </p:cNvPr>
+          <p:cNvSpPr/>
           <p:nvPr/>
         </p:nvSpPr>
         <p:spPr>
           <a:xfrm>
-            <a:off x="1604356" y="2044931"/>
-            <a:ext cx="974113" cy="369332"/>
+            <a:off x="1716957" y="1461978"/>
+            <a:ext cx="2173399" cy="656706"/>
           </a:xfrm>
           <a:prstGeom prst="rect">
             <a:avLst/>
           </a:prstGeom>
-          <a:noFill/>
-        </p:spPr>
-        <p:txBody>
-          <a:bodyPr wrap="none" rtlCol="0">
-            <a:spAutoFit/>
-          </a:bodyPr>
-          <a:lstStyle/>
-          <a:p>
-            <a:r>
-              <a:rPr lang="fr-CA" dirty="0"/>
-              <a:t>ÉTAPE 1</a:t>
-            </a:r>
-          </a:p>
-        </p:txBody>
-      </p:sp>
-      <p:sp>
-        <p:nvSpPr>
-          <p:cNvPr id="21" name="ZoneTexte 20">
-            <a:extLst>
-              <a:ext uri="{FF2B5EF4-FFF2-40B4-BE49-F238E27FC236}">
-                <a16:creationId xmlns:a16="http://schemas.microsoft.com/office/drawing/2014/main" id="{401DBB35-1B8D-4726-BFFF-97E19583884F}"/>
-              </a:ext>
-            </a:extLst>
-          </p:cNvPr>
-          <p:cNvSpPr txBox="1"/>
-          <p:nvPr/>
-        </p:nvSpPr>
-        <p:spPr>
-          <a:xfrm>
-            <a:off x="5256414" y="2012665"/>
-            <a:ext cx="974113" cy="369332"/>
-          </a:xfrm>
-          <a:prstGeom prst="rect">
-            <a:avLst/>
-          </a:prstGeom>
-          <a:noFill/>
-        </p:spPr>
-        <p:txBody>
-          <a:bodyPr wrap="none" rtlCol="0">
-            <a:spAutoFit/>
-          </a:bodyPr>
-          <a:lstStyle/>
-          <a:p>
-            <a:r>
-              <a:rPr lang="fr-CA" dirty="0"/>
-              <a:t>ÉTAPE 2</a:t>
-            </a:r>
-          </a:p>
-        </p:txBody>
-      </p:sp>
-      <p:sp>
-        <p:nvSpPr>
-          <p:cNvPr id="22" name="ZoneTexte 21">
-            <a:extLst>
-              <a:ext uri="{FF2B5EF4-FFF2-40B4-BE49-F238E27FC236}">
-                <a16:creationId xmlns:a16="http://schemas.microsoft.com/office/drawing/2014/main" id="{0C619344-B7CF-4931-B8A7-9D8F02B63CC7}"/>
-              </a:ext>
-            </a:extLst>
-          </p:cNvPr>
-          <p:cNvSpPr txBox="1"/>
-          <p:nvPr/>
-        </p:nvSpPr>
-        <p:spPr>
-          <a:xfrm>
-            <a:off x="8908473" y="2010695"/>
-            <a:ext cx="974113" cy="369332"/>
-          </a:xfrm>
-          <a:prstGeom prst="rect">
-            <a:avLst/>
-          </a:prstGeom>
-          <a:noFill/>
-        </p:spPr>
-        <p:txBody>
-          <a:bodyPr wrap="none" rtlCol="0">
-            <a:spAutoFit/>
-          </a:bodyPr>
-          <a:lstStyle/>
-          <a:p>
-            <a:r>
-              <a:rPr lang="fr-CA" dirty="0"/>
-              <a:t>ÉTAPE 3</a:t>
-            </a:r>
-          </a:p>
-        </p:txBody>
-      </p:sp>
-      <p:sp>
-        <p:nvSpPr>
-          <p:cNvPr id="25" name="Rectangle : coins arrondis 24">
-            <a:extLst>
-              <a:ext uri="{FF2B5EF4-FFF2-40B4-BE49-F238E27FC236}">
-                <a16:creationId xmlns:a16="http://schemas.microsoft.com/office/drawing/2014/main" id="{E9948463-3623-4E8E-A009-2155C79BDBC9}"/>
-              </a:ext>
-            </a:extLst>
-          </p:cNvPr>
-          <p:cNvSpPr/>
-          <p:nvPr/>
-        </p:nvSpPr>
-        <p:spPr>
-          <a:xfrm>
-            <a:off x="1388986" y="3552890"/>
-            <a:ext cx="1404851" cy="997528"/>
-          </a:xfrm>
-          <a:prstGeom prst="roundRect">
-            <a:avLst/>
-          </a:prstGeom>
+          <a:solidFill>
+            <a:schemeClr val="accent5"/>
+          </a:solidFill>
+          <a:ln>
+            <a:solidFill>
+              <a:schemeClr val="accent5"/>
+            </a:solidFill>
+          </a:ln>
         </p:spPr>
         <p:style>
           <a:lnRef idx="2">
@@ -3808,18 +4529,22 @@
           <a:p>
             <a:pPr algn="ctr"/>
             <a:r>
+              <a:rPr lang="fr-CA" dirty="0" err="1"/>
+              <a:t>loop</a:t>
+            </a:r>
+            <a:r>
               <a:rPr lang="fr-CA" dirty="0"/>
-              <a:t>Mesurer le nouvel état</a:t>
-            </a:r>
-          </a:p>
-        </p:txBody>
-      </p:sp>
-      <p:sp>
-        <p:nvSpPr>
-          <p:cNvPr id="26" name="Losange 25">
-            <a:extLst>
-              <a:ext uri="{FF2B5EF4-FFF2-40B4-BE49-F238E27FC236}">
-                <a16:creationId xmlns:a16="http://schemas.microsoft.com/office/drawing/2014/main" id="{798D0B29-D323-4426-ABB0-590F694D8C20}"/>
+              <a:t>( )</a:t>
+            </a:r>
+          </a:p>
+        </p:txBody>
+      </p:sp>
+      <p:sp>
+        <p:nvSpPr>
+          <p:cNvPr id="15" name="Losange 14">
+            <a:extLst>
+              <a:ext uri="{FF2B5EF4-FFF2-40B4-BE49-F238E27FC236}">
+                <a16:creationId xmlns:a16="http://schemas.microsoft.com/office/drawing/2014/main" id="{3CB409AA-A4E8-4A7D-B663-A1D3C8CB26CD}"/>
               </a:ext>
             </a:extLst>
           </p:cNvPr>
@@ -3828,12 +4553,20 @@
         </p:nvSpPr>
         <p:spPr>
           <a:xfrm>
-            <a:off x="4231178" y="3036515"/>
-            <a:ext cx="3100647" cy="2030275"/>
+            <a:off x="1525776" y="2451632"/>
+            <a:ext cx="2555762" cy="1810444"/>
           </a:xfrm>
           <a:prstGeom prst="diamond">
             <a:avLst/>
           </a:prstGeom>
+          <a:solidFill>
+            <a:schemeClr val="accent5"/>
+          </a:solidFill>
+          <a:ln>
+            <a:solidFill>
+              <a:schemeClr val="accent5"/>
+            </a:solidFill>
+          </a:ln>
         </p:spPr>
         <p:style>
           <a:lnRef idx="2">
@@ -3857,18 +4590,60 @@
           <a:p>
             <a:pPr algn="ctr"/>
             <a:r>
-              <a:rPr lang="fr-CA" dirty="0"/>
-              <a:t>Comparer le nouvel état avec l’état précédent</a:t>
-            </a:r>
-          </a:p>
-        </p:txBody>
-      </p:sp>
-      <p:sp>
-        <p:nvSpPr>
-          <p:cNvPr id="27" name="Rectangle : coins arrondis 26">
-            <a:extLst>
-              <a:ext uri="{FF2B5EF4-FFF2-40B4-BE49-F238E27FC236}">
-                <a16:creationId xmlns:a16="http://schemas.microsoft.com/office/drawing/2014/main" id="{16B684E1-94CE-408F-AB04-5CB1C2861110}"/>
+              <a:rPr lang="fr-CA" sz="1400" dirty="0"/>
+              <a:t>Est-ce que l’état de l’interrupteur a changé?</a:t>
+            </a:r>
+          </a:p>
+        </p:txBody>
+      </p:sp>
+      <p:cxnSp>
+        <p:nvCxnSpPr>
+          <p:cNvPr id="5" name="Connecteur droit avec flèche 4">
+            <a:extLst>
+              <a:ext uri="{FF2B5EF4-FFF2-40B4-BE49-F238E27FC236}">
+                <a16:creationId xmlns:a16="http://schemas.microsoft.com/office/drawing/2014/main" id="{09D8AB89-BDEE-426F-BD13-777BFD7CD1D0}"/>
+              </a:ext>
+            </a:extLst>
+          </p:cNvPr>
+          <p:cNvCxnSpPr>
+            <a:cxnSpLocks/>
+            <a:stCxn id="12" idx="2"/>
+          </p:cNvCxnSpPr>
+          <p:nvPr/>
+        </p:nvCxnSpPr>
+        <p:spPr>
+          <a:xfrm flipH="1">
+            <a:off x="2803656" y="2118684"/>
+            <a:ext cx="1" cy="295276"/>
+          </a:xfrm>
+          <a:prstGeom prst="straightConnector1">
+            <a:avLst/>
+          </a:prstGeom>
+          <a:ln>
+            <a:tailEnd type="triangle"/>
+          </a:ln>
+        </p:spPr>
+        <p:style>
+          <a:lnRef idx="1">
+            <a:schemeClr val="accent1"/>
+          </a:lnRef>
+          <a:fillRef idx="0">
+            <a:schemeClr val="accent1"/>
+          </a:fillRef>
+          <a:effectRef idx="0">
+            <a:schemeClr val="accent1"/>
+          </a:effectRef>
+          <a:fontRef idx="minor">
+            <a:schemeClr val="tx1"/>
+          </a:fontRef>
+        </p:style>
+      </p:cxnSp>
+      <p:sp>
+        <p:nvSpPr>
+          <p:cNvPr id="18" name="Rectangle 17">
+            <a:extLst>
+              <a:ext uri="{FF2B5EF4-FFF2-40B4-BE49-F238E27FC236}">
+                <a16:creationId xmlns:a16="http://schemas.microsoft.com/office/drawing/2014/main" id="{007E2D7E-D926-43D7-82A5-624CE26E9319}"/>
               </a:ext>
             </a:extLst>
           </p:cNvPr>
@@ -3877,12 +4652,20 @@
         </p:nvSpPr>
         <p:spPr>
           <a:xfrm>
-            <a:off x="8421617" y="3446210"/>
-            <a:ext cx="1947823" cy="1210887"/>
-          </a:xfrm>
-          <a:prstGeom prst="roundRect">
+            <a:off x="5328055" y="2885411"/>
+            <a:ext cx="2173399" cy="942887"/>
+          </a:xfrm>
+          <a:prstGeom prst="rect">
             <a:avLst/>
           </a:prstGeom>
+          <a:solidFill>
+            <a:schemeClr val="accent5"/>
+          </a:solidFill>
+          <a:ln>
+            <a:solidFill>
+              <a:schemeClr val="accent5"/>
+            </a:solidFill>
+          </a:ln>
         </p:spPr>
         <p:style>
           <a:lnRef idx="2">
@@ -3907,33 +4690,172 @@
             <a:pPr algn="ctr"/>
             <a:r>
               <a:rPr lang="fr-CA" dirty="0"/>
-              <a:t>Emmagasiner en mémoire le nouvel état</a:t>
+              <a:t>Envoyer la valeur de l’interrupteur</a:t>
             </a:r>
           </a:p>
         </p:txBody>
       </p:sp>
       <p:cxnSp>
         <p:nvCxnSpPr>
-          <p:cNvPr id="29" name="Connecteur droit avec flèche 28">
-            <a:extLst>
-              <a:ext uri="{FF2B5EF4-FFF2-40B4-BE49-F238E27FC236}">
-                <a16:creationId xmlns:a16="http://schemas.microsoft.com/office/drawing/2014/main" id="{71BB3E57-90C6-4B26-8B1B-2B4622D8D779}"/>
+          <p:cNvPr id="8" name="Connecteur droit avec flèche 7">
+            <a:extLst>
+              <a:ext uri="{FF2B5EF4-FFF2-40B4-BE49-F238E27FC236}">
+                <a16:creationId xmlns:a16="http://schemas.microsoft.com/office/drawing/2014/main" id="{D6D4BCEC-8F8C-46A7-8936-CE1967BE75F8}"/>
               </a:ext>
             </a:extLst>
           </p:cNvPr>
           <p:cNvCxnSpPr>
-            <a:stCxn id="25" idx="3"/>
-            <a:endCxn id="26" idx="1"/>
+            <a:cxnSpLocks/>
+            <a:stCxn id="15" idx="3"/>
+            <a:endCxn id="18" idx="1"/>
           </p:cNvCxnSpPr>
           <p:nvPr/>
         </p:nvCxnSpPr>
         <p:spPr>
-          <a:xfrm flipV="1">
-            <a:off x="2793837" y="4051653"/>
-            <a:ext cx="1437341" cy="1"/>
+          <a:xfrm>
+            <a:off x="4081538" y="3356854"/>
+            <a:ext cx="1246517" cy="1"/>
           </a:xfrm>
           <a:prstGeom prst="straightConnector1">
             <a:avLst/>
+          </a:prstGeom>
+          <a:ln>
+            <a:tailEnd type="triangle"/>
+          </a:ln>
+        </p:spPr>
+        <p:style>
+          <a:lnRef idx="1">
+            <a:schemeClr val="accent1"/>
+          </a:lnRef>
+          <a:fillRef idx="0">
+            <a:schemeClr val="accent1"/>
+          </a:fillRef>
+          <a:effectRef idx="0">
+            <a:schemeClr val="accent1"/>
+          </a:effectRef>
+          <a:fontRef idx="minor">
+            <a:schemeClr val="tx1"/>
+          </a:fontRef>
+        </p:style>
+      </p:cxnSp>
+      <p:sp>
+        <p:nvSpPr>
+          <p:cNvPr id="9" name="ZoneTexte 8">
+            <a:extLst>
+              <a:ext uri="{FF2B5EF4-FFF2-40B4-BE49-F238E27FC236}">
+                <a16:creationId xmlns:a16="http://schemas.microsoft.com/office/drawing/2014/main" id="{D0B86496-3F0B-408E-A914-6B34EE4322B0}"/>
+              </a:ext>
+            </a:extLst>
+          </p:cNvPr>
+          <p:cNvSpPr txBox="1"/>
+          <p:nvPr/>
+        </p:nvSpPr>
+        <p:spPr>
+          <a:xfrm>
+            <a:off x="4342254" y="3356854"/>
+            <a:ext cx="565265" cy="276999"/>
+          </a:xfrm>
+          <a:prstGeom prst="rect">
+            <a:avLst/>
+          </a:prstGeom>
+          <a:noFill/>
+        </p:spPr>
+        <p:txBody>
+          <a:bodyPr wrap="square" rtlCol="0">
+            <a:spAutoFit/>
+          </a:bodyPr>
+          <a:lstStyle/>
+          <a:p>
+            <a:pPr algn="ctr"/>
+            <a:r>
+              <a:rPr lang="fr-CA" sz="1200" dirty="0"/>
+              <a:t>oui</a:t>
+            </a:r>
+          </a:p>
+        </p:txBody>
+      </p:sp>
+      <p:sp>
+        <p:nvSpPr>
+          <p:cNvPr id="23" name="Rectangle 22">
+            <a:extLst>
+              <a:ext uri="{FF2B5EF4-FFF2-40B4-BE49-F238E27FC236}">
+                <a16:creationId xmlns:a16="http://schemas.microsoft.com/office/drawing/2014/main" id="{CCEB7A2D-C881-4867-9B46-D9F9AA091E2B}"/>
+              </a:ext>
+            </a:extLst>
+          </p:cNvPr>
+          <p:cNvSpPr/>
+          <p:nvPr/>
+        </p:nvSpPr>
+        <p:spPr>
+          <a:xfrm>
+            <a:off x="5328054" y="3908616"/>
+            <a:ext cx="2173399" cy="917466"/>
+          </a:xfrm>
+          <a:prstGeom prst="rect">
+            <a:avLst/>
+          </a:prstGeom>
+          <a:solidFill>
+            <a:schemeClr val="accent5"/>
+          </a:solidFill>
+          <a:ln>
+            <a:solidFill>
+              <a:schemeClr val="accent5"/>
+            </a:solidFill>
+          </a:ln>
+        </p:spPr>
+        <p:style>
+          <a:lnRef idx="2">
+            <a:schemeClr val="accent1">
+              <a:shade val="50000"/>
+            </a:schemeClr>
+          </a:lnRef>
+          <a:fillRef idx="1">
+            <a:schemeClr val="accent1"/>
+          </a:fillRef>
+          <a:effectRef idx="0">
+            <a:schemeClr val="accent1"/>
+          </a:effectRef>
+          <a:fontRef idx="minor">
+            <a:schemeClr val="lt1"/>
+          </a:fontRef>
+        </p:style>
+        <p:txBody>
+          <a:bodyPr rtlCol="0" anchor="ctr"/>
+          <a:lstStyle/>
+          <a:p>
+            <a:pPr algn="ctr"/>
+            <a:r>
+              <a:rPr lang="fr-CA" dirty="0"/>
+              <a:t>Mettre en mémoire la valeur de l’interrupteur</a:t>
+            </a:r>
+          </a:p>
+        </p:txBody>
+      </p:sp>
+      <p:cxnSp>
+        <p:nvCxnSpPr>
+          <p:cNvPr id="13" name="Connecteur : en angle 12">
+            <a:extLst>
+              <a:ext uri="{FF2B5EF4-FFF2-40B4-BE49-F238E27FC236}">
+                <a16:creationId xmlns:a16="http://schemas.microsoft.com/office/drawing/2014/main" id="{9B82D46E-A86F-49B6-B0F9-D5BCB6C94835}"/>
+              </a:ext>
+            </a:extLst>
+          </p:cNvPr>
+          <p:cNvCxnSpPr>
+            <a:cxnSpLocks/>
+            <a:stCxn id="18" idx="2"/>
+            <a:endCxn id="23" idx="0"/>
+          </p:cNvCxnSpPr>
+          <p:nvPr/>
+        </p:nvCxnSpPr>
+        <p:spPr>
+          <a:xfrm rot="5400000">
+            <a:off x="6374596" y="3868457"/>
+            <a:ext cx="80318" cy="1"/>
+          </a:xfrm>
+          <a:prstGeom prst="bentConnector3">
+            <a:avLst>
+              <a:gd name="adj1" fmla="val 50000"/>
+            </a:avLst>
           </a:prstGeom>
           <a:ln>
             <a:tailEnd type="triangle"/>
@@ -3956,26 +4878,30 @@
       </p:cxnSp>
       <p:cxnSp>
         <p:nvCxnSpPr>
-          <p:cNvPr id="31" name="Connecteur droit avec flèche 30">
-            <a:extLst>
-              <a:ext uri="{FF2B5EF4-FFF2-40B4-BE49-F238E27FC236}">
-                <a16:creationId xmlns:a16="http://schemas.microsoft.com/office/drawing/2014/main" id="{C2834A98-8CFE-4BCA-8E3E-CBB5A5D1FB3A}"/>
+          <p:cNvPr id="63" name="Connecteur : en angle 62">
+            <a:extLst>
+              <a:ext uri="{FF2B5EF4-FFF2-40B4-BE49-F238E27FC236}">
+                <a16:creationId xmlns:a16="http://schemas.microsoft.com/office/drawing/2014/main" id="{D8764911-17E8-4573-9491-2EC1174737D8}"/>
               </a:ext>
             </a:extLst>
           </p:cNvPr>
           <p:cNvCxnSpPr>
-            <a:stCxn id="26" idx="3"/>
-            <a:endCxn id="27" idx="1"/>
+            <a:cxnSpLocks/>
+            <a:stCxn id="15" idx="2"/>
+            <a:endCxn id="12" idx="1"/>
           </p:cNvCxnSpPr>
           <p:nvPr/>
         </p:nvCxnSpPr>
         <p:spPr>
-          <a:xfrm>
-            <a:off x="7331825" y="4051653"/>
-            <a:ext cx="1089792" cy="1"/>
-          </a:xfrm>
-          <a:prstGeom prst="straightConnector1">
-            <a:avLst/>
+          <a:xfrm rot="5400000" flipH="1">
+            <a:off x="1024434" y="2482854"/>
+            <a:ext cx="2471745" cy="1086700"/>
+          </a:xfrm>
+          <a:prstGeom prst="bentConnector4">
+            <a:avLst>
+              <a:gd name="adj1" fmla="val -9249"/>
+              <a:gd name="adj2" fmla="val 138629"/>
+            </a:avLst>
           </a:prstGeom>
           <a:ln>
             <a:tailEnd type="triangle"/>
@@ -3996,10 +4922,93 @@
           </a:fontRef>
         </p:style>
       </p:cxnSp>
+      <p:cxnSp>
+        <p:nvCxnSpPr>
+          <p:cNvPr id="65" name="Connecteur : en angle 64">
+            <a:extLst>
+              <a:ext uri="{FF2B5EF4-FFF2-40B4-BE49-F238E27FC236}">
+                <a16:creationId xmlns:a16="http://schemas.microsoft.com/office/drawing/2014/main" id="{9B54337D-1F68-417F-B06E-FFD67F1B050B}"/>
+              </a:ext>
+            </a:extLst>
+          </p:cNvPr>
+          <p:cNvCxnSpPr>
+            <a:cxnSpLocks/>
+            <a:stCxn id="23" idx="2"/>
+            <a:endCxn id="12" idx="0"/>
+          </p:cNvCxnSpPr>
+          <p:nvPr/>
+        </p:nvCxnSpPr>
+        <p:spPr>
+          <a:xfrm rot="5400000" flipH="1">
+            <a:off x="2927154" y="1338482"/>
+            <a:ext cx="3364104" cy="3611097"/>
+          </a:xfrm>
+          <a:prstGeom prst="bentConnector5">
+            <a:avLst>
+              <a:gd name="adj1" fmla="val -6795"/>
+              <a:gd name="adj2" fmla="val -37936"/>
+              <a:gd name="adj3" fmla="val 106795"/>
+            </a:avLst>
+          </a:prstGeom>
+          <a:ln>
+            <a:tailEnd type="triangle"/>
+          </a:ln>
+        </p:spPr>
+        <p:style>
+          <a:lnRef idx="1">
+            <a:schemeClr val="accent1"/>
+          </a:lnRef>
+          <a:fillRef idx="0">
+            <a:schemeClr val="accent1"/>
+          </a:fillRef>
+          <a:effectRef idx="0">
+            <a:schemeClr val="accent1"/>
+          </a:effectRef>
+          <a:fontRef idx="minor">
+            <a:schemeClr val="tx1"/>
+          </a:fontRef>
+        </p:style>
+      </p:cxnSp>
+      <p:sp>
+        <p:nvSpPr>
+          <p:cNvPr id="68" name="ZoneTexte 67">
+            <a:extLst>
+              <a:ext uri="{FF2B5EF4-FFF2-40B4-BE49-F238E27FC236}">
+                <a16:creationId xmlns:a16="http://schemas.microsoft.com/office/drawing/2014/main" id="{078C4111-2A88-40D8-AFFE-AC4A60F00E7F}"/>
+              </a:ext>
+            </a:extLst>
+          </p:cNvPr>
+          <p:cNvSpPr txBox="1"/>
+          <p:nvPr/>
+        </p:nvSpPr>
+        <p:spPr>
+          <a:xfrm>
+            <a:off x="2462834" y="4549086"/>
+            <a:ext cx="565265" cy="276999"/>
+          </a:xfrm>
+          <a:prstGeom prst="rect">
+            <a:avLst/>
+          </a:prstGeom>
+          <a:noFill/>
+        </p:spPr>
+        <p:txBody>
+          <a:bodyPr wrap="square" rtlCol="0">
+            <a:spAutoFit/>
+          </a:bodyPr>
+          <a:lstStyle/>
+          <a:p>
+            <a:pPr algn="ctr"/>
+            <a:r>
+              <a:rPr lang="fr-CA" sz="1200" dirty="0"/>
+              <a:t>non</a:t>
+            </a:r>
+          </a:p>
+        </p:txBody>
+      </p:sp>
     </p:spTree>
     <p:extLst>
       <p:ext uri="{BB962C8B-B14F-4D97-AF65-F5344CB8AC3E}">
-        <p14:creationId xmlns:p14="http://schemas.microsoft.com/office/powerpoint/2010/main" val="1805285094"/>
+        <p14:creationId xmlns:p14="http://schemas.microsoft.com/office/powerpoint/2010/main" val="958468640"/>
       </p:ext>
     </p:extLst>
   </p:cSld>
@@ -4031,7 +5040,7 @@
           <p:cNvPr id="2" name="Titre 1">
             <a:extLst>
               <a:ext uri="{FF2B5EF4-FFF2-40B4-BE49-F238E27FC236}">
-                <a16:creationId xmlns:a16="http://schemas.microsoft.com/office/drawing/2014/main" id="{D0244DB7-1D8B-4CE1-AE30-7CD751B9BC3B}"/>
+                <a16:creationId xmlns:a16="http://schemas.microsoft.com/office/drawing/2014/main" id="{7005A587-273D-4A3C-859E-17AD32EABF34}"/>
               </a:ext>
             </a:extLst>
           </p:cNvPr>
@@ -4042,72 +5051,361 @@
             <p:ph type="title"/>
           </p:nvPr>
         </p:nvSpPr>
+        <p:spPr/>
+        <p:txBody>
+          <a:bodyPr>
+            <a:normAutofit/>
+          </a:bodyPr>
+          <a:lstStyle/>
+          <a:p>
+            <a:r>
+              <a:rPr lang="en-CA" sz="2800" dirty="0"/>
+              <a:t>CODER LA DÉTECTION DE CHANGEMENT D’ÉTAT</a:t>
+            </a:r>
+            <a:endParaRPr lang="fr-CA" sz="2800" dirty="0"/>
+          </a:p>
+        </p:txBody>
+      </p:sp>
+      <p:sp>
+        <p:nvSpPr>
+          <p:cNvPr id="20" name="ZoneTexte 19">
+            <a:extLst>
+              <a:ext uri="{FF2B5EF4-FFF2-40B4-BE49-F238E27FC236}">
+                <a16:creationId xmlns:a16="http://schemas.microsoft.com/office/drawing/2014/main" id="{C75052FA-19EF-4A88-BB95-05B39DAA1B2F}"/>
+              </a:ext>
+            </a:extLst>
+          </p:cNvPr>
+          <p:cNvSpPr txBox="1"/>
+          <p:nvPr/>
+        </p:nvSpPr>
         <p:spPr>
           <a:xfrm>
-            <a:off x="838200" y="748146"/>
-            <a:ext cx="10515600" cy="5361708"/>
-          </a:xfrm>
-        </p:spPr>
-        <p:txBody>
-          <a:bodyPr>
-            <a:noAutofit/>
+            <a:off x="1604356" y="2044931"/>
+            <a:ext cx="974113" cy="369332"/>
+          </a:xfrm>
+          <a:prstGeom prst="rect">
+            <a:avLst/>
+          </a:prstGeom>
+          <a:noFill/>
+        </p:spPr>
+        <p:txBody>
+          <a:bodyPr wrap="none" rtlCol="0">
+            <a:spAutoFit/>
           </a:bodyPr>
           <a:lstStyle/>
           <a:p>
-            <a:pPr algn="l"/>
-            <a:r>
-              <a:rPr lang="en-CA" sz="3200" spc="0" dirty="0">
-                <a:solidFill>
-                  <a:schemeClr val="bg2"/>
-                </a:solidFill>
-              </a:rPr>
-              <a:t>EXERCICE</a:t>
-            </a:r>
-            <a:br>
-              <a:rPr lang="en-CA" sz="3200" spc="0" dirty="0"/>
-            </a:br>
-            <a:r>
-              <a:rPr lang="en-CA" sz="3200" spc="0" dirty="0"/>
-              <a:t>GARDEZ VOTRE CIRCUIT QUI INCLUT UN INTERRUPTEUR ET UNE DEL À VOTRE CARTE. </a:t>
-            </a:r>
-            <a:br>
-              <a:rPr lang="en-CA" sz="3200" spc="0" dirty="0"/>
-            </a:br>
-            <a:br>
-              <a:rPr lang="en-CA" sz="3200" spc="0" dirty="0"/>
-            </a:br>
-            <a:r>
-              <a:rPr lang="en-CA" sz="3200" spc="0" dirty="0">
-                <a:solidFill>
-                  <a:schemeClr val="accent4"/>
-                </a:solidFill>
-              </a:rPr>
-              <a:t>RÉDIGER UNE </a:t>
-            </a:r>
-            <a:r>
-              <a:rPr lang="en-CA" sz="3200" spc="0" dirty="0">
-                <a:solidFill>
-                  <a:schemeClr val="accent5"/>
-                </a:solidFill>
-              </a:rPr>
-              <a:t>NOUVELLE VERSION DU CODE </a:t>
-            </a:r>
-            <a:r>
-              <a:rPr lang="en-CA" sz="3200" spc="0" dirty="0"/>
-              <a:t>OÙ VOUS DÉMARREZ LE CLIGNOTEMENT EN APPUYANT UNE PREMIÈRE FOIS ET ARRÊTEZ LE CLIGNOTEMENT LORSQUE VOUS APPUYEZ UNE DEUXIÈME FOIS SUR L’INTERRUPTEUR.</a:t>
-            </a:r>
-            <a:endParaRPr lang="fr-CA" sz="3200" spc="0" dirty="0">
-              <a:solidFill>
-                <a:schemeClr val="accent4"/>
-              </a:solidFill>
-            </a:endParaRPr>
-          </a:p>
-        </p:txBody>
-      </p:sp>
+            <a:r>
+              <a:rPr lang="fr-CA" dirty="0"/>
+              <a:t>ÉTAPE 1</a:t>
+            </a:r>
+          </a:p>
+        </p:txBody>
+      </p:sp>
+      <p:sp>
+        <p:nvSpPr>
+          <p:cNvPr id="21" name="ZoneTexte 20">
+            <a:extLst>
+              <a:ext uri="{FF2B5EF4-FFF2-40B4-BE49-F238E27FC236}">
+                <a16:creationId xmlns:a16="http://schemas.microsoft.com/office/drawing/2014/main" id="{401DBB35-1B8D-4726-BFFF-97E19583884F}"/>
+              </a:ext>
+            </a:extLst>
+          </p:cNvPr>
+          <p:cNvSpPr txBox="1"/>
+          <p:nvPr/>
+        </p:nvSpPr>
+        <p:spPr>
+          <a:xfrm>
+            <a:off x="5256414" y="2012665"/>
+            <a:ext cx="974113" cy="369332"/>
+          </a:xfrm>
+          <a:prstGeom prst="rect">
+            <a:avLst/>
+          </a:prstGeom>
+          <a:noFill/>
+        </p:spPr>
+        <p:txBody>
+          <a:bodyPr wrap="none" rtlCol="0">
+            <a:spAutoFit/>
+          </a:bodyPr>
+          <a:lstStyle/>
+          <a:p>
+            <a:r>
+              <a:rPr lang="fr-CA" dirty="0"/>
+              <a:t>ÉTAPE 2</a:t>
+            </a:r>
+          </a:p>
+        </p:txBody>
+      </p:sp>
+      <p:sp>
+        <p:nvSpPr>
+          <p:cNvPr id="22" name="ZoneTexte 21">
+            <a:extLst>
+              <a:ext uri="{FF2B5EF4-FFF2-40B4-BE49-F238E27FC236}">
+                <a16:creationId xmlns:a16="http://schemas.microsoft.com/office/drawing/2014/main" id="{0C619344-B7CF-4931-B8A7-9D8F02B63CC7}"/>
+              </a:ext>
+            </a:extLst>
+          </p:cNvPr>
+          <p:cNvSpPr txBox="1"/>
+          <p:nvPr/>
+        </p:nvSpPr>
+        <p:spPr>
+          <a:xfrm>
+            <a:off x="8908473" y="2010695"/>
+            <a:ext cx="974113" cy="369332"/>
+          </a:xfrm>
+          <a:prstGeom prst="rect">
+            <a:avLst/>
+          </a:prstGeom>
+          <a:noFill/>
+        </p:spPr>
+        <p:txBody>
+          <a:bodyPr wrap="none" rtlCol="0">
+            <a:spAutoFit/>
+          </a:bodyPr>
+          <a:lstStyle/>
+          <a:p>
+            <a:r>
+              <a:rPr lang="fr-CA" dirty="0"/>
+              <a:t>ÉTAPE 3</a:t>
+            </a:r>
+          </a:p>
+        </p:txBody>
+      </p:sp>
+      <p:sp>
+        <p:nvSpPr>
+          <p:cNvPr id="25" name="Rectangle : coins arrondis 24">
+            <a:extLst>
+              <a:ext uri="{FF2B5EF4-FFF2-40B4-BE49-F238E27FC236}">
+                <a16:creationId xmlns:a16="http://schemas.microsoft.com/office/drawing/2014/main" id="{E9948463-3623-4E8E-A009-2155C79BDBC9}"/>
+              </a:ext>
+            </a:extLst>
+          </p:cNvPr>
+          <p:cNvSpPr/>
+          <p:nvPr/>
+        </p:nvSpPr>
+        <p:spPr>
+          <a:xfrm>
+            <a:off x="1388986" y="3552890"/>
+            <a:ext cx="1404851" cy="997528"/>
+          </a:xfrm>
+          <a:prstGeom prst="roundRect">
+            <a:avLst/>
+          </a:prstGeom>
+        </p:spPr>
+        <p:style>
+          <a:lnRef idx="2">
+            <a:schemeClr val="accent1">
+              <a:shade val="50000"/>
+            </a:schemeClr>
+          </a:lnRef>
+          <a:fillRef idx="1">
+            <a:schemeClr val="accent1"/>
+          </a:fillRef>
+          <a:effectRef idx="0">
+            <a:schemeClr val="accent1"/>
+          </a:effectRef>
+          <a:fontRef idx="minor">
+            <a:schemeClr val="lt1"/>
+          </a:fontRef>
+        </p:style>
+        <p:txBody>
+          <a:bodyPr rtlCol="0" anchor="ctr"/>
+          <a:lstStyle/>
+          <a:p>
+            <a:pPr algn="ctr"/>
+            <a:r>
+              <a:rPr lang="fr-CA" dirty="0"/>
+              <a:t>Mesurer le nouvel état</a:t>
+            </a:r>
+          </a:p>
+        </p:txBody>
+      </p:sp>
+      <p:sp>
+        <p:nvSpPr>
+          <p:cNvPr id="26" name="Losange 25">
+            <a:extLst>
+              <a:ext uri="{FF2B5EF4-FFF2-40B4-BE49-F238E27FC236}">
+                <a16:creationId xmlns:a16="http://schemas.microsoft.com/office/drawing/2014/main" id="{798D0B29-D323-4426-ABB0-590F694D8C20}"/>
+              </a:ext>
+            </a:extLst>
+          </p:cNvPr>
+          <p:cNvSpPr/>
+          <p:nvPr/>
+        </p:nvSpPr>
+        <p:spPr>
+          <a:xfrm>
+            <a:off x="4231178" y="3036515"/>
+            <a:ext cx="3100647" cy="2030275"/>
+          </a:xfrm>
+          <a:prstGeom prst="diamond">
+            <a:avLst/>
+          </a:prstGeom>
+        </p:spPr>
+        <p:style>
+          <a:lnRef idx="2">
+            <a:schemeClr val="accent1">
+              <a:shade val="50000"/>
+            </a:schemeClr>
+          </a:lnRef>
+          <a:fillRef idx="1">
+            <a:schemeClr val="accent1"/>
+          </a:fillRef>
+          <a:effectRef idx="0">
+            <a:schemeClr val="accent1"/>
+          </a:effectRef>
+          <a:fontRef idx="minor">
+            <a:schemeClr val="lt1"/>
+          </a:fontRef>
+        </p:style>
+        <p:txBody>
+          <a:bodyPr rtlCol="0" anchor="ctr"/>
+          <a:lstStyle/>
+          <a:p>
+            <a:pPr algn="ctr"/>
+            <a:r>
+              <a:rPr lang="fr-CA" dirty="0"/>
+              <a:t>Comparer le nouvel état avec l’état précédent</a:t>
+            </a:r>
+          </a:p>
+        </p:txBody>
+      </p:sp>
+      <p:sp>
+        <p:nvSpPr>
+          <p:cNvPr id="27" name="Rectangle : coins arrondis 26">
+            <a:extLst>
+              <a:ext uri="{FF2B5EF4-FFF2-40B4-BE49-F238E27FC236}">
+                <a16:creationId xmlns:a16="http://schemas.microsoft.com/office/drawing/2014/main" id="{16B684E1-94CE-408F-AB04-5CB1C2861110}"/>
+              </a:ext>
+            </a:extLst>
+          </p:cNvPr>
+          <p:cNvSpPr/>
+          <p:nvPr/>
+        </p:nvSpPr>
+        <p:spPr>
+          <a:xfrm>
+            <a:off x="8421617" y="3446210"/>
+            <a:ext cx="1947823" cy="1210887"/>
+          </a:xfrm>
+          <a:prstGeom prst="roundRect">
+            <a:avLst/>
+          </a:prstGeom>
+        </p:spPr>
+        <p:style>
+          <a:lnRef idx="2">
+            <a:schemeClr val="accent1">
+              <a:shade val="50000"/>
+            </a:schemeClr>
+          </a:lnRef>
+          <a:fillRef idx="1">
+            <a:schemeClr val="accent1"/>
+          </a:fillRef>
+          <a:effectRef idx="0">
+            <a:schemeClr val="accent1"/>
+          </a:effectRef>
+          <a:fontRef idx="minor">
+            <a:schemeClr val="lt1"/>
+          </a:fontRef>
+        </p:style>
+        <p:txBody>
+          <a:bodyPr rtlCol="0" anchor="ctr"/>
+          <a:lstStyle/>
+          <a:p>
+            <a:pPr algn="ctr"/>
+            <a:r>
+              <a:rPr lang="fr-CA" dirty="0"/>
+              <a:t>Emmagasiner en mémoire le nouvel état</a:t>
+            </a:r>
+          </a:p>
+        </p:txBody>
+      </p:sp>
+      <p:cxnSp>
+        <p:nvCxnSpPr>
+          <p:cNvPr id="29" name="Connecteur droit avec flèche 28">
+            <a:extLst>
+              <a:ext uri="{FF2B5EF4-FFF2-40B4-BE49-F238E27FC236}">
+                <a16:creationId xmlns:a16="http://schemas.microsoft.com/office/drawing/2014/main" id="{71BB3E57-90C6-4B26-8B1B-2B4622D8D779}"/>
+              </a:ext>
+            </a:extLst>
+          </p:cNvPr>
+          <p:cNvCxnSpPr>
+            <a:stCxn id="25" idx="3"/>
+            <a:endCxn id="26" idx="1"/>
+          </p:cNvCxnSpPr>
+          <p:nvPr/>
+        </p:nvCxnSpPr>
+        <p:spPr>
+          <a:xfrm flipV="1">
+            <a:off x="2793837" y="4051653"/>
+            <a:ext cx="1437341" cy="1"/>
+          </a:xfrm>
+          <a:prstGeom prst="straightConnector1">
+            <a:avLst/>
+          </a:prstGeom>
+          <a:ln>
+            <a:tailEnd type="triangle"/>
+          </a:ln>
+        </p:spPr>
+        <p:style>
+          <a:lnRef idx="1">
+            <a:schemeClr val="accent1"/>
+          </a:lnRef>
+          <a:fillRef idx="0">
+            <a:schemeClr val="accent1"/>
+          </a:fillRef>
+          <a:effectRef idx="0">
+            <a:schemeClr val="accent1"/>
+          </a:effectRef>
+          <a:fontRef idx="minor">
+            <a:schemeClr val="tx1"/>
+          </a:fontRef>
+        </p:style>
+      </p:cxnSp>
+      <p:cxnSp>
+        <p:nvCxnSpPr>
+          <p:cNvPr id="31" name="Connecteur droit avec flèche 30">
+            <a:extLst>
+              <a:ext uri="{FF2B5EF4-FFF2-40B4-BE49-F238E27FC236}">
+                <a16:creationId xmlns:a16="http://schemas.microsoft.com/office/drawing/2014/main" id="{C2834A98-8CFE-4BCA-8E3E-CBB5A5D1FB3A}"/>
+              </a:ext>
+            </a:extLst>
+          </p:cNvPr>
+          <p:cNvCxnSpPr>
+            <a:stCxn id="26" idx="3"/>
+            <a:endCxn id="27" idx="1"/>
+          </p:cNvCxnSpPr>
+          <p:nvPr/>
+        </p:nvCxnSpPr>
+        <p:spPr>
+          <a:xfrm>
+            <a:off x="7331825" y="4051653"/>
+            <a:ext cx="1089792" cy="1"/>
+          </a:xfrm>
+          <a:prstGeom prst="straightConnector1">
+            <a:avLst/>
+          </a:prstGeom>
+          <a:ln>
+            <a:tailEnd type="triangle"/>
+          </a:ln>
+        </p:spPr>
+        <p:style>
+          <a:lnRef idx="1">
+            <a:schemeClr val="accent1"/>
+          </a:lnRef>
+          <a:fillRef idx="0">
+            <a:schemeClr val="accent1"/>
+          </a:fillRef>
+          <a:effectRef idx="0">
+            <a:schemeClr val="accent1"/>
+          </a:effectRef>
+          <a:fontRef idx="minor">
+            <a:schemeClr val="tx1"/>
+          </a:fontRef>
+        </p:style>
+      </p:cxnSp>
     </p:spTree>
     <p:extLst>
       <p:ext uri="{BB962C8B-B14F-4D97-AF65-F5344CB8AC3E}">
-        <p14:creationId xmlns:p14="http://schemas.microsoft.com/office/powerpoint/2010/main" val="3373365802"/>
+        <p14:creationId xmlns:p14="http://schemas.microsoft.com/office/powerpoint/2010/main" val="1805285094"/>
       </p:ext>
     </p:extLst>
   </p:cSld>
@@ -4139,7 +5437,7 @@
           <p:cNvPr id="2" name="Titre 1">
             <a:extLst>
               <a:ext uri="{FF2B5EF4-FFF2-40B4-BE49-F238E27FC236}">
-                <a16:creationId xmlns:a16="http://schemas.microsoft.com/office/drawing/2014/main" id="{7005A587-273D-4A3C-859E-17AD32EABF34}"/>
+                <a16:creationId xmlns:a16="http://schemas.microsoft.com/office/drawing/2014/main" id="{D0244DB7-1D8B-4CE1-AE30-7CD751B9BC3B}"/>
               </a:ext>
             </a:extLst>
           </p:cNvPr>
@@ -4152,1078 +5450,70 @@
         </p:nvSpPr>
         <p:spPr>
           <a:xfrm>
-            <a:off x="838200" y="365125"/>
-            <a:ext cx="10515600" cy="702869"/>
+            <a:off x="838200" y="748146"/>
+            <a:ext cx="10515600" cy="5361708"/>
           </a:xfrm>
         </p:spPr>
         <p:txBody>
           <a:bodyPr>
-            <a:normAutofit/>
+            <a:noAutofit/>
           </a:bodyPr>
           <a:lstStyle/>
           <a:p>
-            <a:r>
-              <a:rPr lang="en-CA" sz="2400" dirty="0"/>
-              <a:t>CODER LA DÉTECTION DE CHANGEMENT D’ÉTAT : GRAPHE</a:t>
-            </a:r>
-            <a:endParaRPr lang="fr-CA" sz="2400" dirty="0"/>
-          </a:p>
-        </p:txBody>
-      </p:sp>
-      <p:sp>
-        <p:nvSpPr>
-          <p:cNvPr id="12" name="Rectangle 11">
-            <a:extLst>
-              <a:ext uri="{FF2B5EF4-FFF2-40B4-BE49-F238E27FC236}">
-                <a16:creationId xmlns:a16="http://schemas.microsoft.com/office/drawing/2014/main" id="{63D854D8-E907-4FD6-BEF5-4F2885AA8EF5}"/>
-              </a:ext>
-            </a:extLst>
-          </p:cNvPr>
-          <p:cNvSpPr/>
-          <p:nvPr/>
-        </p:nvSpPr>
-        <p:spPr>
-          <a:xfrm>
-            <a:off x="1692019" y="1204284"/>
-            <a:ext cx="2173399" cy="656706"/>
-          </a:xfrm>
-          <a:prstGeom prst="rect">
-            <a:avLst/>
-          </a:prstGeom>
-          <a:solidFill>
-            <a:schemeClr val="accent5"/>
-          </a:solidFill>
-          <a:ln>
-            <a:solidFill>
-              <a:schemeClr val="accent5"/>
-            </a:solidFill>
-          </a:ln>
-        </p:spPr>
-        <p:style>
-          <a:lnRef idx="2">
-            <a:schemeClr val="accent1">
-              <a:shade val="50000"/>
-            </a:schemeClr>
-          </a:lnRef>
-          <a:fillRef idx="1">
-            <a:schemeClr val="accent1"/>
-          </a:fillRef>
-          <a:effectRef idx="0">
-            <a:schemeClr val="accent1"/>
-          </a:effectRef>
-          <a:fontRef idx="minor">
-            <a:schemeClr val="lt1"/>
-          </a:fontRef>
-        </p:style>
-        <p:txBody>
-          <a:bodyPr rtlCol="0" anchor="ctr"/>
-          <a:lstStyle/>
-          <a:p>
-            <a:pPr algn="ctr"/>
-            <a:r>
-              <a:rPr lang="fr-CA" dirty="0" err="1"/>
-              <a:t>loop</a:t>
-            </a:r>
-            <a:r>
-              <a:rPr lang="fr-CA" dirty="0"/>
-              <a:t>( )</a:t>
-            </a:r>
-          </a:p>
-        </p:txBody>
-      </p:sp>
-      <p:sp>
-        <p:nvSpPr>
-          <p:cNvPr id="15" name="Rectangle 14">
-            <a:extLst>
-              <a:ext uri="{FF2B5EF4-FFF2-40B4-BE49-F238E27FC236}">
-                <a16:creationId xmlns:a16="http://schemas.microsoft.com/office/drawing/2014/main" id="{3CB409AA-A4E8-4A7D-B663-A1D3C8CB26CD}"/>
-              </a:ext>
-            </a:extLst>
-          </p:cNvPr>
-          <p:cNvSpPr/>
-          <p:nvPr/>
-        </p:nvSpPr>
-        <p:spPr>
-          <a:xfrm>
-            <a:off x="1692018" y="2156266"/>
-            <a:ext cx="2173399" cy="942894"/>
-          </a:xfrm>
-          <a:prstGeom prst="rect">
-            <a:avLst/>
-          </a:prstGeom>
-          <a:solidFill>
-            <a:schemeClr val="accent5"/>
-          </a:solidFill>
-          <a:ln>
-            <a:solidFill>
-              <a:schemeClr val="accent5"/>
-            </a:solidFill>
-          </a:ln>
-        </p:spPr>
-        <p:style>
-          <a:lnRef idx="2">
-            <a:schemeClr val="accent1">
-              <a:shade val="50000"/>
-            </a:schemeClr>
-          </a:lnRef>
-          <a:fillRef idx="1">
-            <a:schemeClr val="accent1"/>
-          </a:fillRef>
-          <a:effectRef idx="0">
-            <a:schemeClr val="accent1"/>
-          </a:effectRef>
-          <a:fontRef idx="minor">
-            <a:schemeClr val="lt1"/>
-          </a:fontRef>
-        </p:style>
-        <p:txBody>
-          <a:bodyPr rtlCol="0" anchor="ctr"/>
-          <a:lstStyle/>
-          <a:p>
-            <a:pPr algn="ctr"/>
-            <a:r>
-              <a:rPr lang="fr-CA" dirty="0"/>
-              <a:t>Est-ce que l’état de l’interrupteur a changé?</a:t>
-            </a:r>
-          </a:p>
-        </p:txBody>
-      </p:sp>
-      <p:cxnSp>
-        <p:nvCxnSpPr>
-          <p:cNvPr id="5" name="Connecteur droit avec flèche 4">
-            <a:extLst>
-              <a:ext uri="{FF2B5EF4-FFF2-40B4-BE49-F238E27FC236}">
-                <a16:creationId xmlns:a16="http://schemas.microsoft.com/office/drawing/2014/main" id="{09D8AB89-BDEE-426F-BD13-777BFD7CD1D0}"/>
-              </a:ext>
-            </a:extLst>
-          </p:cNvPr>
-          <p:cNvCxnSpPr>
-            <a:cxnSpLocks/>
-            <a:stCxn id="12" idx="2"/>
-            <a:endCxn id="15" idx="0"/>
-          </p:cNvCxnSpPr>
-          <p:nvPr/>
-        </p:nvCxnSpPr>
-        <p:spPr>
-          <a:xfrm flipH="1">
-            <a:off x="2778718" y="1860990"/>
-            <a:ext cx="1" cy="295276"/>
-          </a:xfrm>
-          <a:prstGeom prst="straightConnector1">
-            <a:avLst/>
-          </a:prstGeom>
-          <a:ln>
-            <a:tailEnd type="triangle"/>
-          </a:ln>
-        </p:spPr>
-        <p:style>
-          <a:lnRef idx="1">
-            <a:schemeClr val="accent1"/>
-          </a:lnRef>
-          <a:fillRef idx="0">
-            <a:schemeClr val="accent1"/>
-          </a:fillRef>
-          <a:effectRef idx="0">
-            <a:schemeClr val="accent1"/>
-          </a:effectRef>
-          <a:fontRef idx="minor">
-            <a:schemeClr val="tx1"/>
-          </a:fontRef>
-        </p:style>
-      </p:cxnSp>
-      <p:sp>
-        <p:nvSpPr>
-          <p:cNvPr id="18" name="Rectangle 17">
-            <a:extLst>
-              <a:ext uri="{FF2B5EF4-FFF2-40B4-BE49-F238E27FC236}">
-                <a16:creationId xmlns:a16="http://schemas.microsoft.com/office/drawing/2014/main" id="{007E2D7E-D926-43D7-82A5-624CE26E9319}"/>
-              </a:ext>
-            </a:extLst>
-          </p:cNvPr>
-          <p:cNvSpPr/>
-          <p:nvPr/>
-        </p:nvSpPr>
-        <p:spPr>
-          <a:xfrm>
-            <a:off x="5312522" y="2156273"/>
-            <a:ext cx="2173399" cy="942887"/>
-          </a:xfrm>
-          <a:prstGeom prst="rect">
-            <a:avLst/>
-          </a:prstGeom>
-          <a:solidFill>
-            <a:schemeClr val="accent5"/>
-          </a:solidFill>
-          <a:ln>
-            <a:solidFill>
-              <a:schemeClr val="accent5"/>
-            </a:solidFill>
-          </a:ln>
-        </p:spPr>
-        <p:style>
-          <a:lnRef idx="2">
-            <a:schemeClr val="accent1">
-              <a:shade val="50000"/>
-            </a:schemeClr>
-          </a:lnRef>
-          <a:fillRef idx="1">
-            <a:schemeClr val="accent1"/>
-          </a:fillRef>
-          <a:effectRef idx="0">
-            <a:schemeClr val="accent1"/>
-          </a:effectRef>
-          <a:fontRef idx="minor">
-            <a:schemeClr val="lt1"/>
-          </a:fontRef>
-        </p:style>
-        <p:txBody>
-          <a:bodyPr rtlCol="0" anchor="ctr"/>
-          <a:lstStyle/>
-          <a:p>
-            <a:pPr algn="ctr"/>
-            <a:r>
-              <a:rPr lang="fr-CA" dirty="0"/>
-              <a:t>Est-ce que l’interrupteur a été appuyé?</a:t>
-            </a:r>
-          </a:p>
-        </p:txBody>
-      </p:sp>
-      <p:cxnSp>
-        <p:nvCxnSpPr>
-          <p:cNvPr id="8" name="Connecteur droit avec flèche 7">
-            <a:extLst>
-              <a:ext uri="{FF2B5EF4-FFF2-40B4-BE49-F238E27FC236}">
-                <a16:creationId xmlns:a16="http://schemas.microsoft.com/office/drawing/2014/main" id="{D6D4BCEC-8F8C-46A7-8936-CE1967BE75F8}"/>
-              </a:ext>
-            </a:extLst>
-          </p:cNvPr>
-          <p:cNvCxnSpPr>
-            <a:stCxn id="15" idx="3"/>
-            <a:endCxn id="18" idx="1"/>
-          </p:cNvCxnSpPr>
-          <p:nvPr/>
-        </p:nvCxnSpPr>
-        <p:spPr>
-          <a:xfrm>
-            <a:off x="3865417" y="2627713"/>
-            <a:ext cx="1447105" cy="4"/>
-          </a:xfrm>
-          <a:prstGeom prst="straightConnector1">
-            <a:avLst/>
-          </a:prstGeom>
-          <a:ln>
-            <a:tailEnd type="triangle"/>
-          </a:ln>
-        </p:spPr>
-        <p:style>
-          <a:lnRef idx="1">
-            <a:schemeClr val="accent1"/>
-          </a:lnRef>
-          <a:fillRef idx="0">
-            <a:schemeClr val="accent1"/>
-          </a:fillRef>
-          <a:effectRef idx="0">
-            <a:schemeClr val="accent1"/>
-          </a:effectRef>
-          <a:fontRef idx="minor">
-            <a:schemeClr val="tx1"/>
-          </a:fontRef>
-        </p:style>
-      </p:cxnSp>
-      <p:sp>
-        <p:nvSpPr>
-          <p:cNvPr id="9" name="ZoneTexte 8">
-            <a:extLst>
-              <a:ext uri="{FF2B5EF4-FFF2-40B4-BE49-F238E27FC236}">
-                <a16:creationId xmlns:a16="http://schemas.microsoft.com/office/drawing/2014/main" id="{D0B86496-3F0B-408E-A914-6B34EE4322B0}"/>
-              </a:ext>
-            </a:extLst>
-          </p:cNvPr>
-          <p:cNvSpPr txBox="1"/>
-          <p:nvPr/>
-        </p:nvSpPr>
-        <p:spPr>
-          <a:xfrm>
-            <a:off x="4330931" y="2362478"/>
-            <a:ext cx="565265" cy="276999"/>
-          </a:xfrm>
-          <a:prstGeom prst="rect">
-            <a:avLst/>
-          </a:prstGeom>
-          <a:noFill/>
-        </p:spPr>
-        <p:txBody>
-          <a:bodyPr wrap="square" rtlCol="0">
-            <a:spAutoFit/>
-          </a:bodyPr>
-          <a:lstStyle/>
-          <a:p>
-            <a:pPr algn="ctr"/>
-            <a:r>
-              <a:rPr lang="fr-CA" sz="1200" dirty="0"/>
-              <a:t>oui</a:t>
-            </a:r>
-          </a:p>
-        </p:txBody>
-      </p:sp>
-      <p:sp>
-        <p:nvSpPr>
-          <p:cNvPr id="23" name="Rectangle 22">
-            <a:extLst>
-              <a:ext uri="{FF2B5EF4-FFF2-40B4-BE49-F238E27FC236}">
-                <a16:creationId xmlns:a16="http://schemas.microsoft.com/office/drawing/2014/main" id="{CCEB7A2D-C881-4867-9B46-D9F9AA091E2B}"/>
-              </a:ext>
-            </a:extLst>
-          </p:cNvPr>
-          <p:cNvSpPr/>
-          <p:nvPr/>
-        </p:nvSpPr>
-        <p:spPr>
-          <a:xfrm>
-            <a:off x="1692018" y="3661931"/>
-            <a:ext cx="2173399" cy="917466"/>
-          </a:xfrm>
-          <a:prstGeom prst="rect">
-            <a:avLst/>
-          </a:prstGeom>
-          <a:solidFill>
-            <a:schemeClr val="accent5"/>
-          </a:solidFill>
-          <a:ln>
-            <a:solidFill>
-              <a:schemeClr val="accent5"/>
-            </a:solidFill>
-          </a:ln>
-        </p:spPr>
-        <p:style>
-          <a:lnRef idx="2">
-            <a:schemeClr val="accent1">
-              <a:shade val="50000"/>
-            </a:schemeClr>
-          </a:lnRef>
-          <a:fillRef idx="1">
-            <a:schemeClr val="accent1"/>
-          </a:fillRef>
-          <a:effectRef idx="0">
-            <a:schemeClr val="accent1"/>
-          </a:effectRef>
-          <a:fontRef idx="minor">
-            <a:schemeClr val="lt1"/>
-          </a:fontRef>
-        </p:style>
-        <p:txBody>
-          <a:bodyPr rtlCol="0" anchor="ctr"/>
-          <a:lstStyle/>
-          <a:p>
-            <a:pPr algn="ctr"/>
-            <a:r>
-              <a:rPr lang="fr-CA" dirty="0"/>
-              <a:t>Mettre en mémoire la valeur de l’interrupteur</a:t>
-            </a:r>
-          </a:p>
-        </p:txBody>
-      </p:sp>
-      <p:sp>
-        <p:nvSpPr>
-          <p:cNvPr id="24" name="Rectangle 23">
-            <a:extLst>
-              <a:ext uri="{FF2B5EF4-FFF2-40B4-BE49-F238E27FC236}">
-                <a16:creationId xmlns:a16="http://schemas.microsoft.com/office/drawing/2014/main" id="{4921856A-CEE8-4B8D-80E2-BFB3397D3F23}"/>
-              </a:ext>
-            </a:extLst>
-          </p:cNvPr>
-          <p:cNvSpPr/>
-          <p:nvPr/>
-        </p:nvSpPr>
-        <p:spPr>
-          <a:xfrm>
-            <a:off x="8558757" y="2168030"/>
-            <a:ext cx="2173399" cy="942894"/>
-          </a:xfrm>
-          <a:prstGeom prst="rect">
-            <a:avLst/>
-          </a:prstGeom>
-          <a:solidFill>
-            <a:schemeClr val="accent5"/>
-          </a:solidFill>
-          <a:ln>
-            <a:solidFill>
-              <a:schemeClr val="accent5"/>
-            </a:solidFill>
-          </a:ln>
-        </p:spPr>
-        <p:style>
-          <a:lnRef idx="2">
-            <a:schemeClr val="accent1">
-              <a:shade val="50000"/>
-            </a:schemeClr>
-          </a:lnRef>
-          <a:fillRef idx="1">
-            <a:schemeClr val="accent1"/>
-          </a:fillRef>
-          <a:effectRef idx="0">
-            <a:schemeClr val="accent1"/>
-          </a:effectRef>
-          <a:fontRef idx="minor">
-            <a:schemeClr val="lt1"/>
-          </a:fontRef>
-        </p:style>
-        <p:txBody>
-          <a:bodyPr rtlCol="0" anchor="ctr"/>
-          <a:lstStyle/>
-          <a:p>
-            <a:pPr algn="ctr"/>
-            <a:r>
-              <a:rPr lang="fr-CA" dirty="0"/>
-              <a:t>Changer l’état de l’indicateur de clignotement</a:t>
-            </a:r>
-          </a:p>
-        </p:txBody>
-      </p:sp>
-      <p:cxnSp>
-        <p:nvCxnSpPr>
-          <p:cNvPr id="4" name="Connecteur droit avec flèche 3">
-            <a:extLst>
-              <a:ext uri="{FF2B5EF4-FFF2-40B4-BE49-F238E27FC236}">
-                <a16:creationId xmlns:a16="http://schemas.microsoft.com/office/drawing/2014/main" id="{FE8517B3-B2D3-4E7C-9E56-6F7CB4ACC28D}"/>
-              </a:ext>
-            </a:extLst>
-          </p:cNvPr>
-          <p:cNvCxnSpPr>
-            <a:stCxn id="18" idx="3"/>
-            <a:endCxn id="24" idx="1"/>
-          </p:cNvCxnSpPr>
-          <p:nvPr/>
-        </p:nvCxnSpPr>
-        <p:spPr>
-          <a:xfrm>
-            <a:off x="7485921" y="2627717"/>
-            <a:ext cx="1072836" cy="11760"/>
-          </a:xfrm>
-          <a:prstGeom prst="straightConnector1">
-            <a:avLst/>
-          </a:prstGeom>
-          <a:ln>
-            <a:tailEnd type="triangle"/>
-          </a:ln>
-        </p:spPr>
-        <p:style>
-          <a:lnRef idx="1">
-            <a:schemeClr val="accent1"/>
-          </a:lnRef>
-          <a:fillRef idx="0">
-            <a:schemeClr val="accent1"/>
-          </a:fillRef>
-          <a:effectRef idx="0">
-            <a:schemeClr val="accent1"/>
-          </a:effectRef>
-          <a:fontRef idx="minor">
-            <a:schemeClr val="tx1"/>
-          </a:fontRef>
-        </p:style>
-      </p:cxnSp>
-      <p:sp>
-        <p:nvSpPr>
-          <p:cNvPr id="30" name="ZoneTexte 29">
-            <a:extLst>
-              <a:ext uri="{FF2B5EF4-FFF2-40B4-BE49-F238E27FC236}">
-                <a16:creationId xmlns:a16="http://schemas.microsoft.com/office/drawing/2014/main" id="{82D66A4F-8A5F-49F0-B284-BF2893090C88}"/>
-              </a:ext>
-            </a:extLst>
-          </p:cNvPr>
-          <p:cNvSpPr txBox="1"/>
-          <p:nvPr/>
-        </p:nvSpPr>
-        <p:spPr>
-          <a:xfrm>
-            <a:off x="7741348" y="2362478"/>
-            <a:ext cx="565265" cy="276999"/>
-          </a:xfrm>
-          <a:prstGeom prst="rect">
-            <a:avLst/>
-          </a:prstGeom>
-          <a:noFill/>
-        </p:spPr>
-        <p:txBody>
-          <a:bodyPr wrap="square" rtlCol="0">
-            <a:spAutoFit/>
-          </a:bodyPr>
-          <a:lstStyle/>
-          <a:p>
-            <a:pPr algn="ctr"/>
-            <a:r>
-              <a:rPr lang="fr-CA" sz="1200" dirty="0"/>
-              <a:t>oui</a:t>
-            </a:r>
-          </a:p>
-        </p:txBody>
-      </p:sp>
-      <p:cxnSp>
-        <p:nvCxnSpPr>
-          <p:cNvPr id="13" name="Connecteur : en angle 12">
-            <a:extLst>
-              <a:ext uri="{FF2B5EF4-FFF2-40B4-BE49-F238E27FC236}">
-                <a16:creationId xmlns:a16="http://schemas.microsoft.com/office/drawing/2014/main" id="{9B82D46E-A86F-49B6-B0F9-D5BCB6C94835}"/>
-              </a:ext>
-            </a:extLst>
-          </p:cNvPr>
-          <p:cNvCxnSpPr>
-            <a:cxnSpLocks/>
-            <a:stCxn id="18" idx="2"/>
-            <a:endCxn id="23" idx="0"/>
-          </p:cNvCxnSpPr>
-          <p:nvPr/>
-        </p:nvCxnSpPr>
-        <p:spPr>
-          <a:xfrm rot="5400000">
-            <a:off x="4307585" y="1570293"/>
-            <a:ext cx="562771" cy="3620504"/>
-          </a:xfrm>
-          <a:prstGeom prst="bentConnector3">
-            <a:avLst/>
-          </a:prstGeom>
-          <a:ln>
-            <a:tailEnd type="triangle"/>
-          </a:ln>
-        </p:spPr>
-        <p:style>
-          <a:lnRef idx="1">
-            <a:schemeClr val="accent1"/>
-          </a:lnRef>
-          <a:fillRef idx="0">
-            <a:schemeClr val="accent1"/>
-          </a:fillRef>
-          <a:effectRef idx="0">
-            <a:schemeClr val="accent1"/>
-          </a:effectRef>
-          <a:fontRef idx="minor">
-            <a:schemeClr val="tx1"/>
-          </a:fontRef>
-        </p:style>
-      </p:cxnSp>
-      <p:cxnSp>
-        <p:nvCxnSpPr>
-          <p:cNvPr id="16" name="Connecteur : en angle 15">
-            <a:extLst>
-              <a:ext uri="{FF2B5EF4-FFF2-40B4-BE49-F238E27FC236}">
-                <a16:creationId xmlns:a16="http://schemas.microsoft.com/office/drawing/2014/main" id="{190E9A05-6F57-4594-9B5D-51CCBD181BD4}"/>
-              </a:ext>
-            </a:extLst>
-          </p:cNvPr>
-          <p:cNvCxnSpPr>
-            <a:cxnSpLocks/>
-            <a:stCxn id="24" idx="2"/>
-            <a:endCxn id="23" idx="0"/>
-          </p:cNvCxnSpPr>
-          <p:nvPr/>
-        </p:nvCxnSpPr>
-        <p:spPr>
-          <a:xfrm rot="5400000">
-            <a:off x="5936585" y="-46942"/>
-            <a:ext cx="551007" cy="6866739"/>
-          </a:xfrm>
-          <a:prstGeom prst="bentConnector3">
-            <a:avLst/>
-          </a:prstGeom>
-          <a:ln>
-            <a:tailEnd type="triangle"/>
-          </a:ln>
-        </p:spPr>
-        <p:style>
-          <a:lnRef idx="1">
-            <a:schemeClr val="accent1"/>
-          </a:lnRef>
-          <a:fillRef idx="0">
-            <a:schemeClr val="accent1"/>
-          </a:fillRef>
-          <a:effectRef idx="0">
-            <a:schemeClr val="accent1"/>
-          </a:effectRef>
-          <a:fontRef idx="minor">
-            <a:schemeClr val="tx1"/>
-          </a:fontRef>
-        </p:style>
-      </p:cxnSp>
-      <p:sp>
-        <p:nvSpPr>
-          <p:cNvPr id="32" name="ZoneTexte 31">
-            <a:extLst>
-              <a:ext uri="{FF2B5EF4-FFF2-40B4-BE49-F238E27FC236}">
-                <a16:creationId xmlns:a16="http://schemas.microsoft.com/office/drawing/2014/main" id="{D39F6767-85FF-41D8-A94F-A1907E5DFB17}"/>
-              </a:ext>
-            </a:extLst>
-          </p:cNvPr>
-          <p:cNvSpPr txBox="1"/>
-          <p:nvPr/>
-        </p:nvSpPr>
-        <p:spPr>
-          <a:xfrm>
-            <a:off x="5896204" y="3094297"/>
-            <a:ext cx="565265" cy="276999"/>
-          </a:xfrm>
-          <a:prstGeom prst="rect">
-            <a:avLst/>
-          </a:prstGeom>
-          <a:noFill/>
-        </p:spPr>
-        <p:txBody>
-          <a:bodyPr wrap="square" rtlCol="0">
-            <a:spAutoFit/>
-          </a:bodyPr>
-          <a:lstStyle/>
-          <a:p>
-            <a:pPr algn="ctr"/>
-            <a:r>
-              <a:rPr lang="fr-CA" sz="1200" dirty="0"/>
-              <a:t>non</a:t>
-            </a:r>
-          </a:p>
-        </p:txBody>
-      </p:sp>
-      <p:sp>
-        <p:nvSpPr>
-          <p:cNvPr id="33" name="Rectangle 32">
-            <a:extLst>
-              <a:ext uri="{FF2B5EF4-FFF2-40B4-BE49-F238E27FC236}">
-                <a16:creationId xmlns:a16="http://schemas.microsoft.com/office/drawing/2014/main" id="{8C8D7E53-842A-46ED-9846-4B29B3C5EC99}"/>
-              </a:ext>
-            </a:extLst>
-          </p:cNvPr>
-          <p:cNvSpPr/>
-          <p:nvPr/>
-        </p:nvSpPr>
-        <p:spPr>
-          <a:xfrm>
-            <a:off x="5231461" y="5069304"/>
-            <a:ext cx="2173399" cy="942894"/>
-          </a:xfrm>
-          <a:prstGeom prst="rect">
-            <a:avLst/>
-          </a:prstGeom>
-          <a:solidFill>
-            <a:schemeClr val="accent5"/>
-          </a:solidFill>
-          <a:ln>
-            <a:solidFill>
-              <a:schemeClr val="accent5"/>
-            </a:solidFill>
-          </a:ln>
-        </p:spPr>
-        <p:style>
-          <a:lnRef idx="2">
-            <a:schemeClr val="accent1">
-              <a:shade val="50000"/>
-            </a:schemeClr>
-          </a:lnRef>
-          <a:fillRef idx="1">
-            <a:schemeClr val="accent1"/>
-          </a:fillRef>
-          <a:effectRef idx="0">
-            <a:schemeClr val="accent1"/>
-          </a:effectRef>
-          <a:fontRef idx="minor">
-            <a:schemeClr val="lt1"/>
-          </a:fontRef>
-        </p:style>
-        <p:txBody>
-          <a:bodyPr rtlCol="0" anchor="ctr"/>
-          <a:lstStyle/>
-          <a:p>
-            <a:pPr algn="ctr"/>
-            <a:r>
-              <a:rPr lang="fr-CA" dirty="0"/>
-              <a:t>Allumer et éteindre la DEL.</a:t>
-            </a:r>
-          </a:p>
-        </p:txBody>
-      </p:sp>
-      <p:sp>
-        <p:nvSpPr>
-          <p:cNvPr id="35" name="Rectangle 34">
-            <a:extLst>
-              <a:ext uri="{FF2B5EF4-FFF2-40B4-BE49-F238E27FC236}">
-                <a16:creationId xmlns:a16="http://schemas.microsoft.com/office/drawing/2014/main" id="{490A32CE-56FF-4E7C-9165-D6AFDD28B762}"/>
-              </a:ext>
-            </a:extLst>
-          </p:cNvPr>
-          <p:cNvSpPr/>
-          <p:nvPr/>
-        </p:nvSpPr>
-        <p:spPr>
-          <a:xfrm>
-            <a:off x="1692018" y="4987637"/>
-            <a:ext cx="2173399" cy="1106228"/>
-          </a:xfrm>
-          <a:prstGeom prst="rect">
-            <a:avLst/>
-          </a:prstGeom>
-          <a:solidFill>
-            <a:schemeClr val="accent5"/>
-          </a:solidFill>
-          <a:ln>
-            <a:solidFill>
-              <a:schemeClr val="accent5"/>
-            </a:solidFill>
-          </a:ln>
-        </p:spPr>
-        <p:style>
-          <a:lnRef idx="2">
-            <a:schemeClr val="accent1">
-              <a:shade val="50000"/>
-            </a:schemeClr>
-          </a:lnRef>
-          <a:fillRef idx="1">
-            <a:schemeClr val="accent1"/>
-          </a:fillRef>
-          <a:effectRef idx="0">
-            <a:schemeClr val="accent1"/>
-          </a:effectRef>
-          <a:fontRef idx="minor">
-            <a:schemeClr val="lt1"/>
-          </a:fontRef>
-        </p:style>
-        <p:txBody>
-          <a:bodyPr rtlCol="0" anchor="ctr"/>
-          <a:lstStyle/>
-          <a:p>
-            <a:pPr algn="ctr"/>
-            <a:r>
-              <a:rPr lang="fr-CA" dirty="0"/>
-              <a:t>Est-ce que l’indicateur de clignotement est actif?</a:t>
-            </a:r>
-          </a:p>
-        </p:txBody>
-      </p:sp>
-      <p:cxnSp>
-        <p:nvCxnSpPr>
-          <p:cNvPr id="39" name="Connecteur droit avec flèche 38">
-            <a:extLst>
-              <a:ext uri="{FF2B5EF4-FFF2-40B4-BE49-F238E27FC236}">
-                <a16:creationId xmlns:a16="http://schemas.microsoft.com/office/drawing/2014/main" id="{95D20A08-83BD-409D-A678-0C3F8074FA05}"/>
-              </a:ext>
-            </a:extLst>
-          </p:cNvPr>
-          <p:cNvCxnSpPr>
-            <a:cxnSpLocks/>
-            <a:stCxn id="15" idx="2"/>
-            <a:endCxn id="23" idx="0"/>
-          </p:cNvCxnSpPr>
-          <p:nvPr/>
-        </p:nvCxnSpPr>
-        <p:spPr>
-          <a:xfrm>
-            <a:off x="2778718" y="3099160"/>
-            <a:ext cx="0" cy="562771"/>
-          </a:xfrm>
-          <a:prstGeom prst="straightConnector1">
-            <a:avLst/>
-          </a:prstGeom>
-          <a:ln>
-            <a:tailEnd type="triangle"/>
-          </a:ln>
-        </p:spPr>
-        <p:style>
-          <a:lnRef idx="1">
-            <a:schemeClr val="accent1"/>
-          </a:lnRef>
-          <a:fillRef idx="0">
-            <a:schemeClr val="accent1"/>
-          </a:fillRef>
-          <a:effectRef idx="0">
-            <a:schemeClr val="accent1"/>
-          </a:effectRef>
-          <a:fontRef idx="minor">
-            <a:schemeClr val="tx1"/>
-          </a:fontRef>
-        </p:style>
-      </p:cxnSp>
-      <p:cxnSp>
-        <p:nvCxnSpPr>
-          <p:cNvPr id="48" name="Connecteur droit avec flèche 47">
-            <a:extLst>
-              <a:ext uri="{FF2B5EF4-FFF2-40B4-BE49-F238E27FC236}">
-                <a16:creationId xmlns:a16="http://schemas.microsoft.com/office/drawing/2014/main" id="{A436105C-05E8-4723-86E3-7A2C8438854F}"/>
-              </a:ext>
-            </a:extLst>
-          </p:cNvPr>
-          <p:cNvCxnSpPr>
-            <a:cxnSpLocks/>
-            <a:stCxn id="23" idx="2"/>
-            <a:endCxn id="35" idx="0"/>
-          </p:cNvCxnSpPr>
-          <p:nvPr/>
-        </p:nvCxnSpPr>
-        <p:spPr>
-          <a:xfrm>
-            <a:off x="2778718" y="4579397"/>
-            <a:ext cx="0" cy="408240"/>
-          </a:xfrm>
-          <a:prstGeom prst="straightConnector1">
-            <a:avLst/>
-          </a:prstGeom>
-          <a:ln>
-            <a:tailEnd type="triangle"/>
-          </a:ln>
-        </p:spPr>
-        <p:style>
-          <a:lnRef idx="1">
-            <a:schemeClr val="accent1"/>
-          </a:lnRef>
-          <a:fillRef idx="0">
-            <a:schemeClr val="accent1"/>
-          </a:fillRef>
-          <a:effectRef idx="0">
-            <a:schemeClr val="accent1"/>
-          </a:effectRef>
-          <a:fontRef idx="minor">
-            <a:schemeClr val="tx1"/>
-          </a:fontRef>
-        </p:style>
-      </p:cxnSp>
-      <p:cxnSp>
-        <p:nvCxnSpPr>
-          <p:cNvPr id="51" name="Connecteur droit avec flèche 50">
-            <a:extLst>
-              <a:ext uri="{FF2B5EF4-FFF2-40B4-BE49-F238E27FC236}">
-                <a16:creationId xmlns:a16="http://schemas.microsoft.com/office/drawing/2014/main" id="{7348BDD4-0B99-493C-B0F9-0E3998C5F7D8}"/>
-              </a:ext>
-            </a:extLst>
-          </p:cNvPr>
-          <p:cNvCxnSpPr>
-            <a:stCxn id="35" idx="3"/>
-            <a:endCxn id="33" idx="1"/>
-          </p:cNvCxnSpPr>
-          <p:nvPr/>
-        </p:nvCxnSpPr>
-        <p:spPr>
-          <a:xfrm>
-            <a:off x="3865417" y="5540751"/>
-            <a:ext cx="1366044" cy="0"/>
-          </a:xfrm>
-          <a:prstGeom prst="straightConnector1">
-            <a:avLst/>
-          </a:prstGeom>
-          <a:ln>
-            <a:tailEnd type="triangle"/>
-          </a:ln>
-        </p:spPr>
-        <p:style>
-          <a:lnRef idx="1">
-            <a:schemeClr val="accent1"/>
-          </a:lnRef>
-          <a:fillRef idx="0">
-            <a:schemeClr val="accent1"/>
-          </a:fillRef>
-          <a:effectRef idx="0">
-            <a:schemeClr val="accent1"/>
-          </a:effectRef>
-          <a:fontRef idx="minor">
-            <a:schemeClr val="tx1"/>
-          </a:fontRef>
-        </p:style>
-      </p:cxnSp>
-      <p:cxnSp>
-        <p:nvCxnSpPr>
-          <p:cNvPr id="63" name="Connecteur : en angle 62">
-            <a:extLst>
-              <a:ext uri="{FF2B5EF4-FFF2-40B4-BE49-F238E27FC236}">
-                <a16:creationId xmlns:a16="http://schemas.microsoft.com/office/drawing/2014/main" id="{D8764911-17E8-4573-9491-2EC1174737D8}"/>
-              </a:ext>
-            </a:extLst>
-          </p:cNvPr>
-          <p:cNvCxnSpPr>
-            <a:stCxn id="35" idx="2"/>
-            <a:endCxn id="12" idx="1"/>
-          </p:cNvCxnSpPr>
-          <p:nvPr/>
-        </p:nvCxnSpPr>
-        <p:spPr>
-          <a:xfrm rot="5400000" flipH="1">
-            <a:off x="-45245" y="3269902"/>
-            <a:ext cx="4561228" cy="1086699"/>
-          </a:xfrm>
-          <a:prstGeom prst="bentConnector4">
-            <a:avLst>
-              <a:gd name="adj1" fmla="val -5012"/>
-              <a:gd name="adj2" fmla="val 121036"/>
-            </a:avLst>
-          </a:prstGeom>
-          <a:ln>
-            <a:tailEnd type="triangle"/>
-          </a:ln>
-        </p:spPr>
-        <p:style>
-          <a:lnRef idx="1">
-            <a:schemeClr val="accent1"/>
-          </a:lnRef>
-          <a:fillRef idx="0">
-            <a:schemeClr val="accent1"/>
-          </a:fillRef>
-          <a:effectRef idx="0">
-            <a:schemeClr val="accent1"/>
-          </a:effectRef>
-          <a:fontRef idx="minor">
-            <a:schemeClr val="tx1"/>
-          </a:fontRef>
-        </p:style>
-      </p:cxnSp>
-      <p:cxnSp>
-        <p:nvCxnSpPr>
-          <p:cNvPr id="65" name="Connecteur : en angle 64">
-            <a:extLst>
-              <a:ext uri="{FF2B5EF4-FFF2-40B4-BE49-F238E27FC236}">
-                <a16:creationId xmlns:a16="http://schemas.microsoft.com/office/drawing/2014/main" id="{9B54337D-1F68-417F-B06E-FFD67F1B050B}"/>
-              </a:ext>
-            </a:extLst>
-          </p:cNvPr>
-          <p:cNvCxnSpPr>
-            <a:stCxn id="33" idx="2"/>
-            <a:endCxn id="12" idx="1"/>
-          </p:cNvCxnSpPr>
-          <p:nvPr/>
-        </p:nvCxnSpPr>
-        <p:spPr>
-          <a:xfrm rot="5400000" flipH="1">
-            <a:off x="1765309" y="1459347"/>
-            <a:ext cx="4479561" cy="4626142"/>
-          </a:xfrm>
-          <a:prstGeom prst="bentConnector4">
-            <a:avLst>
-              <a:gd name="adj1" fmla="val -6959"/>
-              <a:gd name="adj2" fmla="val 104941"/>
-            </a:avLst>
-          </a:prstGeom>
-          <a:ln>
-            <a:tailEnd type="triangle"/>
-          </a:ln>
-        </p:spPr>
-        <p:style>
-          <a:lnRef idx="1">
-            <a:schemeClr val="accent1"/>
-          </a:lnRef>
-          <a:fillRef idx="0">
-            <a:schemeClr val="accent1"/>
-          </a:fillRef>
-          <a:effectRef idx="0">
-            <a:schemeClr val="accent1"/>
-          </a:effectRef>
-          <a:fontRef idx="minor">
-            <a:schemeClr val="tx1"/>
-          </a:fontRef>
-        </p:style>
-      </p:cxnSp>
-      <p:sp>
-        <p:nvSpPr>
-          <p:cNvPr id="67" name="ZoneTexte 66">
-            <a:extLst>
-              <a:ext uri="{FF2B5EF4-FFF2-40B4-BE49-F238E27FC236}">
-                <a16:creationId xmlns:a16="http://schemas.microsoft.com/office/drawing/2014/main" id="{384176A1-FDF1-4CCB-AFB0-7606CC82811B}"/>
-              </a:ext>
-            </a:extLst>
-          </p:cNvPr>
-          <p:cNvSpPr txBox="1"/>
-          <p:nvPr/>
-        </p:nvSpPr>
-        <p:spPr>
-          <a:xfrm>
-            <a:off x="4284421" y="5310856"/>
-            <a:ext cx="565265" cy="276999"/>
-          </a:xfrm>
-          <a:prstGeom prst="rect">
-            <a:avLst/>
-          </a:prstGeom>
-          <a:noFill/>
-        </p:spPr>
-        <p:txBody>
-          <a:bodyPr wrap="square" rtlCol="0">
-            <a:spAutoFit/>
-          </a:bodyPr>
-          <a:lstStyle/>
-          <a:p>
-            <a:pPr algn="ctr"/>
-            <a:r>
-              <a:rPr lang="fr-CA" sz="1200" dirty="0"/>
-              <a:t>oui</a:t>
-            </a:r>
-          </a:p>
-        </p:txBody>
-      </p:sp>
-      <p:sp>
-        <p:nvSpPr>
-          <p:cNvPr id="68" name="ZoneTexte 67">
-            <a:extLst>
-              <a:ext uri="{FF2B5EF4-FFF2-40B4-BE49-F238E27FC236}">
-                <a16:creationId xmlns:a16="http://schemas.microsoft.com/office/drawing/2014/main" id="{078C4111-2A88-40D8-AFFE-AC4A60F00E7F}"/>
-              </a:ext>
-            </a:extLst>
-          </p:cNvPr>
-          <p:cNvSpPr txBox="1"/>
-          <p:nvPr/>
-        </p:nvSpPr>
-        <p:spPr>
-          <a:xfrm>
-            <a:off x="2285107" y="3079137"/>
-            <a:ext cx="565265" cy="276999"/>
-          </a:xfrm>
-          <a:prstGeom prst="rect">
-            <a:avLst/>
-          </a:prstGeom>
-          <a:noFill/>
-        </p:spPr>
-        <p:txBody>
-          <a:bodyPr wrap="square" rtlCol="0">
-            <a:spAutoFit/>
-          </a:bodyPr>
-          <a:lstStyle/>
-          <a:p>
-            <a:pPr algn="ctr"/>
-            <a:r>
-              <a:rPr lang="fr-CA" sz="1200" dirty="0"/>
-              <a:t>non</a:t>
-            </a:r>
-          </a:p>
-        </p:txBody>
-      </p:sp>
-      <p:sp>
-        <p:nvSpPr>
-          <p:cNvPr id="69" name="ZoneTexte 68">
-            <a:extLst>
-              <a:ext uri="{FF2B5EF4-FFF2-40B4-BE49-F238E27FC236}">
-                <a16:creationId xmlns:a16="http://schemas.microsoft.com/office/drawing/2014/main" id="{FE60C9BE-257A-40EC-9E64-E25780075D34}"/>
-              </a:ext>
-            </a:extLst>
-          </p:cNvPr>
-          <p:cNvSpPr txBox="1"/>
-          <p:nvPr/>
-        </p:nvSpPr>
-        <p:spPr>
-          <a:xfrm>
-            <a:off x="2285107" y="6057011"/>
-            <a:ext cx="565265" cy="276999"/>
-          </a:xfrm>
-          <a:prstGeom prst="rect">
-            <a:avLst/>
-          </a:prstGeom>
-          <a:noFill/>
-        </p:spPr>
-        <p:txBody>
-          <a:bodyPr wrap="square" rtlCol="0">
-            <a:spAutoFit/>
-          </a:bodyPr>
-          <a:lstStyle/>
-          <a:p>
-            <a:pPr algn="ctr"/>
-            <a:r>
-              <a:rPr lang="fr-CA" sz="1200" dirty="0"/>
-              <a:t>non</a:t>
-            </a:r>
+            <a:pPr algn="l"/>
+            <a:r>
+              <a:rPr lang="en-CA" sz="3200" spc="0" dirty="0">
+                <a:solidFill>
+                  <a:schemeClr val="bg2"/>
+                </a:solidFill>
+              </a:rPr>
+              <a:t>EXERCICE</a:t>
+            </a:r>
+            <a:br>
+              <a:rPr lang="en-CA" sz="3200" spc="0" dirty="0"/>
+            </a:br>
+            <a:r>
+              <a:rPr lang="en-CA" sz="3200" spc="0" dirty="0"/>
+              <a:t>GARDEZ VOTRE CIRCUIT QUI INCLUT UN INTERRUPTEUR ET UNE DEL À VOTRE CARTE. </a:t>
+            </a:r>
+            <a:br>
+              <a:rPr lang="en-CA" sz="3200" spc="0" dirty="0"/>
+            </a:br>
+            <a:br>
+              <a:rPr lang="en-CA" sz="3200" spc="0" dirty="0"/>
+            </a:br>
+            <a:r>
+              <a:rPr lang="en-CA" sz="3200" spc="0" dirty="0">
+                <a:solidFill>
+                  <a:schemeClr val="accent4"/>
+                </a:solidFill>
+              </a:rPr>
+              <a:t>RÉDIGER UNE </a:t>
+            </a:r>
+            <a:r>
+              <a:rPr lang="en-CA" sz="3200" spc="0" dirty="0">
+                <a:solidFill>
+                  <a:schemeClr val="accent5"/>
+                </a:solidFill>
+              </a:rPr>
+              <a:t>NOUVELLE VERSION DU CODE </a:t>
+            </a:r>
+            <a:r>
+              <a:rPr lang="en-CA" sz="3200" spc="0" dirty="0"/>
+              <a:t>OÙ VOUS DÉMARREZ LE CLIGNOTEMENT EN APPUYANT UNE PREMIÈRE FOIS ET ARRÊTEZ LE CLIGNOTEMENT LORSQUE VOUS APPUYEZ UNE DEUXIÈME FOIS SUR L’INTERRUPTEUR.</a:t>
+            </a:r>
+            <a:endParaRPr lang="fr-CA" sz="3200" spc="0" dirty="0">
+              <a:solidFill>
+                <a:schemeClr val="accent4"/>
+              </a:solidFill>
+            </a:endParaRPr>
           </a:p>
         </p:txBody>
       </p:sp>
     </p:spTree>
     <p:extLst>
       <p:ext uri="{BB962C8B-B14F-4D97-AF65-F5344CB8AC3E}">
-        <p14:creationId xmlns:p14="http://schemas.microsoft.com/office/powerpoint/2010/main" val="2682320389"/>
+        <p14:creationId xmlns:p14="http://schemas.microsoft.com/office/powerpoint/2010/main" val="3373365802"/>
       </p:ext>
     </p:extLst>
   </p:cSld>
@@ -5280,6 +5570,1122 @@
           <a:p>
             <a:r>
               <a:rPr lang="en-CA" sz="2400" dirty="0"/>
+              <a:t>CODER LA DÉTECTION DE CHANGEMENT D’ÉTAT : GRAPHE</a:t>
+            </a:r>
+            <a:endParaRPr lang="fr-CA" sz="2400" dirty="0"/>
+          </a:p>
+        </p:txBody>
+      </p:sp>
+      <p:sp>
+        <p:nvSpPr>
+          <p:cNvPr id="12" name="Rectangle 11">
+            <a:extLst>
+              <a:ext uri="{FF2B5EF4-FFF2-40B4-BE49-F238E27FC236}">
+                <a16:creationId xmlns:a16="http://schemas.microsoft.com/office/drawing/2014/main" id="{63D854D8-E907-4FD6-BEF5-4F2885AA8EF5}"/>
+              </a:ext>
+            </a:extLst>
+          </p:cNvPr>
+          <p:cNvSpPr/>
+          <p:nvPr/>
+        </p:nvSpPr>
+        <p:spPr>
+          <a:xfrm>
+            <a:off x="1692019" y="1204284"/>
+            <a:ext cx="2173399" cy="656706"/>
+          </a:xfrm>
+          <a:prstGeom prst="rect">
+            <a:avLst/>
+          </a:prstGeom>
+          <a:solidFill>
+            <a:schemeClr val="accent5"/>
+          </a:solidFill>
+          <a:ln>
+            <a:solidFill>
+              <a:schemeClr val="accent5"/>
+            </a:solidFill>
+          </a:ln>
+        </p:spPr>
+        <p:style>
+          <a:lnRef idx="2">
+            <a:schemeClr val="accent1">
+              <a:shade val="50000"/>
+            </a:schemeClr>
+          </a:lnRef>
+          <a:fillRef idx="1">
+            <a:schemeClr val="accent1"/>
+          </a:fillRef>
+          <a:effectRef idx="0">
+            <a:schemeClr val="accent1"/>
+          </a:effectRef>
+          <a:fontRef idx="minor">
+            <a:schemeClr val="lt1"/>
+          </a:fontRef>
+        </p:style>
+        <p:txBody>
+          <a:bodyPr rtlCol="0" anchor="ctr"/>
+          <a:lstStyle/>
+          <a:p>
+            <a:pPr algn="ctr"/>
+            <a:r>
+              <a:rPr lang="fr-CA" dirty="0" err="1"/>
+              <a:t>loop</a:t>
+            </a:r>
+            <a:r>
+              <a:rPr lang="fr-CA" dirty="0"/>
+              <a:t>( )</a:t>
+            </a:r>
+          </a:p>
+        </p:txBody>
+      </p:sp>
+      <p:sp>
+        <p:nvSpPr>
+          <p:cNvPr id="15" name="Rectangle 14">
+            <a:extLst>
+              <a:ext uri="{FF2B5EF4-FFF2-40B4-BE49-F238E27FC236}">
+                <a16:creationId xmlns:a16="http://schemas.microsoft.com/office/drawing/2014/main" id="{3CB409AA-A4E8-4A7D-B663-A1D3C8CB26CD}"/>
+              </a:ext>
+            </a:extLst>
+          </p:cNvPr>
+          <p:cNvSpPr/>
+          <p:nvPr/>
+        </p:nvSpPr>
+        <p:spPr>
+          <a:xfrm>
+            <a:off x="1692018" y="2156266"/>
+            <a:ext cx="2173399" cy="942894"/>
+          </a:xfrm>
+          <a:prstGeom prst="rect">
+            <a:avLst/>
+          </a:prstGeom>
+          <a:solidFill>
+            <a:schemeClr val="accent5"/>
+          </a:solidFill>
+          <a:ln>
+            <a:solidFill>
+              <a:schemeClr val="accent5"/>
+            </a:solidFill>
+          </a:ln>
+        </p:spPr>
+        <p:style>
+          <a:lnRef idx="2">
+            <a:schemeClr val="accent1">
+              <a:shade val="50000"/>
+            </a:schemeClr>
+          </a:lnRef>
+          <a:fillRef idx="1">
+            <a:schemeClr val="accent1"/>
+          </a:fillRef>
+          <a:effectRef idx="0">
+            <a:schemeClr val="accent1"/>
+          </a:effectRef>
+          <a:fontRef idx="minor">
+            <a:schemeClr val="lt1"/>
+          </a:fontRef>
+        </p:style>
+        <p:txBody>
+          <a:bodyPr rtlCol="0" anchor="ctr"/>
+          <a:lstStyle/>
+          <a:p>
+            <a:pPr algn="ctr"/>
+            <a:r>
+              <a:rPr lang="fr-CA" dirty="0"/>
+              <a:t>Est-ce que l’état de l’interrupteur a changé?</a:t>
+            </a:r>
+          </a:p>
+        </p:txBody>
+      </p:sp>
+      <p:cxnSp>
+        <p:nvCxnSpPr>
+          <p:cNvPr id="5" name="Connecteur droit avec flèche 4">
+            <a:extLst>
+              <a:ext uri="{FF2B5EF4-FFF2-40B4-BE49-F238E27FC236}">
+                <a16:creationId xmlns:a16="http://schemas.microsoft.com/office/drawing/2014/main" id="{09D8AB89-BDEE-426F-BD13-777BFD7CD1D0}"/>
+              </a:ext>
+            </a:extLst>
+          </p:cNvPr>
+          <p:cNvCxnSpPr>
+            <a:cxnSpLocks/>
+            <a:stCxn id="12" idx="2"/>
+            <a:endCxn id="15" idx="0"/>
+          </p:cNvCxnSpPr>
+          <p:nvPr/>
+        </p:nvCxnSpPr>
+        <p:spPr>
+          <a:xfrm flipH="1">
+            <a:off x="2778718" y="1860990"/>
+            <a:ext cx="1" cy="295276"/>
+          </a:xfrm>
+          <a:prstGeom prst="straightConnector1">
+            <a:avLst/>
+          </a:prstGeom>
+          <a:ln>
+            <a:tailEnd type="triangle"/>
+          </a:ln>
+        </p:spPr>
+        <p:style>
+          <a:lnRef idx="1">
+            <a:schemeClr val="accent1"/>
+          </a:lnRef>
+          <a:fillRef idx="0">
+            <a:schemeClr val="accent1"/>
+          </a:fillRef>
+          <a:effectRef idx="0">
+            <a:schemeClr val="accent1"/>
+          </a:effectRef>
+          <a:fontRef idx="minor">
+            <a:schemeClr val="tx1"/>
+          </a:fontRef>
+        </p:style>
+      </p:cxnSp>
+      <p:sp>
+        <p:nvSpPr>
+          <p:cNvPr id="18" name="Rectangle 17">
+            <a:extLst>
+              <a:ext uri="{FF2B5EF4-FFF2-40B4-BE49-F238E27FC236}">
+                <a16:creationId xmlns:a16="http://schemas.microsoft.com/office/drawing/2014/main" id="{007E2D7E-D926-43D7-82A5-624CE26E9319}"/>
+              </a:ext>
+            </a:extLst>
+          </p:cNvPr>
+          <p:cNvSpPr/>
+          <p:nvPr/>
+        </p:nvSpPr>
+        <p:spPr>
+          <a:xfrm>
+            <a:off x="5312522" y="2156273"/>
+            <a:ext cx="2173399" cy="942887"/>
+          </a:xfrm>
+          <a:prstGeom prst="rect">
+            <a:avLst/>
+          </a:prstGeom>
+          <a:solidFill>
+            <a:schemeClr val="accent5"/>
+          </a:solidFill>
+          <a:ln>
+            <a:solidFill>
+              <a:schemeClr val="accent5"/>
+            </a:solidFill>
+          </a:ln>
+        </p:spPr>
+        <p:style>
+          <a:lnRef idx="2">
+            <a:schemeClr val="accent1">
+              <a:shade val="50000"/>
+            </a:schemeClr>
+          </a:lnRef>
+          <a:fillRef idx="1">
+            <a:schemeClr val="accent1"/>
+          </a:fillRef>
+          <a:effectRef idx="0">
+            <a:schemeClr val="accent1"/>
+          </a:effectRef>
+          <a:fontRef idx="minor">
+            <a:schemeClr val="lt1"/>
+          </a:fontRef>
+        </p:style>
+        <p:txBody>
+          <a:bodyPr rtlCol="0" anchor="ctr"/>
+          <a:lstStyle/>
+          <a:p>
+            <a:pPr algn="ctr"/>
+            <a:r>
+              <a:rPr lang="fr-CA" dirty="0"/>
+              <a:t>Est-ce que l’interrupteur a été appuyé?</a:t>
+            </a:r>
+          </a:p>
+        </p:txBody>
+      </p:sp>
+      <p:cxnSp>
+        <p:nvCxnSpPr>
+          <p:cNvPr id="8" name="Connecteur droit avec flèche 7">
+            <a:extLst>
+              <a:ext uri="{FF2B5EF4-FFF2-40B4-BE49-F238E27FC236}">
+                <a16:creationId xmlns:a16="http://schemas.microsoft.com/office/drawing/2014/main" id="{D6D4BCEC-8F8C-46A7-8936-CE1967BE75F8}"/>
+              </a:ext>
+            </a:extLst>
+          </p:cNvPr>
+          <p:cNvCxnSpPr>
+            <a:stCxn id="15" idx="3"/>
+            <a:endCxn id="18" idx="1"/>
+          </p:cNvCxnSpPr>
+          <p:nvPr/>
+        </p:nvCxnSpPr>
+        <p:spPr>
+          <a:xfrm>
+            <a:off x="3865417" y="2627713"/>
+            <a:ext cx="1447105" cy="4"/>
+          </a:xfrm>
+          <a:prstGeom prst="straightConnector1">
+            <a:avLst/>
+          </a:prstGeom>
+          <a:ln>
+            <a:tailEnd type="triangle"/>
+          </a:ln>
+        </p:spPr>
+        <p:style>
+          <a:lnRef idx="1">
+            <a:schemeClr val="accent1"/>
+          </a:lnRef>
+          <a:fillRef idx="0">
+            <a:schemeClr val="accent1"/>
+          </a:fillRef>
+          <a:effectRef idx="0">
+            <a:schemeClr val="accent1"/>
+          </a:effectRef>
+          <a:fontRef idx="minor">
+            <a:schemeClr val="tx1"/>
+          </a:fontRef>
+        </p:style>
+      </p:cxnSp>
+      <p:sp>
+        <p:nvSpPr>
+          <p:cNvPr id="9" name="ZoneTexte 8">
+            <a:extLst>
+              <a:ext uri="{FF2B5EF4-FFF2-40B4-BE49-F238E27FC236}">
+                <a16:creationId xmlns:a16="http://schemas.microsoft.com/office/drawing/2014/main" id="{D0B86496-3F0B-408E-A914-6B34EE4322B0}"/>
+              </a:ext>
+            </a:extLst>
+          </p:cNvPr>
+          <p:cNvSpPr txBox="1"/>
+          <p:nvPr/>
+        </p:nvSpPr>
+        <p:spPr>
+          <a:xfrm>
+            <a:off x="4330931" y="2362478"/>
+            <a:ext cx="565265" cy="276999"/>
+          </a:xfrm>
+          <a:prstGeom prst="rect">
+            <a:avLst/>
+          </a:prstGeom>
+          <a:noFill/>
+        </p:spPr>
+        <p:txBody>
+          <a:bodyPr wrap="square" rtlCol="0">
+            <a:spAutoFit/>
+          </a:bodyPr>
+          <a:lstStyle/>
+          <a:p>
+            <a:pPr algn="ctr"/>
+            <a:r>
+              <a:rPr lang="fr-CA" sz="1200" dirty="0"/>
+              <a:t>oui</a:t>
+            </a:r>
+          </a:p>
+        </p:txBody>
+      </p:sp>
+      <p:sp>
+        <p:nvSpPr>
+          <p:cNvPr id="23" name="Rectangle 22">
+            <a:extLst>
+              <a:ext uri="{FF2B5EF4-FFF2-40B4-BE49-F238E27FC236}">
+                <a16:creationId xmlns:a16="http://schemas.microsoft.com/office/drawing/2014/main" id="{CCEB7A2D-C881-4867-9B46-D9F9AA091E2B}"/>
+              </a:ext>
+            </a:extLst>
+          </p:cNvPr>
+          <p:cNvSpPr/>
+          <p:nvPr/>
+        </p:nvSpPr>
+        <p:spPr>
+          <a:xfrm>
+            <a:off x="1692018" y="3661931"/>
+            <a:ext cx="2173399" cy="917466"/>
+          </a:xfrm>
+          <a:prstGeom prst="rect">
+            <a:avLst/>
+          </a:prstGeom>
+          <a:solidFill>
+            <a:schemeClr val="accent5"/>
+          </a:solidFill>
+          <a:ln>
+            <a:solidFill>
+              <a:schemeClr val="accent5"/>
+            </a:solidFill>
+          </a:ln>
+        </p:spPr>
+        <p:style>
+          <a:lnRef idx="2">
+            <a:schemeClr val="accent1">
+              <a:shade val="50000"/>
+            </a:schemeClr>
+          </a:lnRef>
+          <a:fillRef idx="1">
+            <a:schemeClr val="accent1"/>
+          </a:fillRef>
+          <a:effectRef idx="0">
+            <a:schemeClr val="accent1"/>
+          </a:effectRef>
+          <a:fontRef idx="minor">
+            <a:schemeClr val="lt1"/>
+          </a:fontRef>
+        </p:style>
+        <p:txBody>
+          <a:bodyPr rtlCol="0" anchor="ctr"/>
+          <a:lstStyle/>
+          <a:p>
+            <a:pPr algn="ctr"/>
+            <a:r>
+              <a:rPr lang="fr-CA" dirty="0"/>
+              <a:t>Mettre en mémoire la valeur de l’interrupteur</a:t>
+            </a:r>
+          </a:p>
+        </p:txBody>
+      </p:sp>
+      <p:sp>
+        <p:nvSpPr>
+          <p:cNvPr id="24" name="Rectangle 23">
+            <a:extLst>
+              <a:ext uri="{FF2B5EF4-FFF2-40B4-BE49-F238E27FC236}">
+                <a16:creationId xmlns:a16="http://schemas.microsoft.com/office/drawing/2014/main" id="{4921856A-CEE8-4B8D-80E2-BFB3397D3F23}"/>
+              </a:ext>
+            </a:extLst>
+          </p:cNvPr>
+          <p:cNvSpPr/>
+          <p:nvPr/>
+        </p:nvSpPr>
+        <p:spPr>
+          <a:xfrm>
+            <a:off x="8558757" y="2168030"/>
+            <a:ext cx="2173399" cy="942894"/>
+          </a:xfrm>
+          <a:prstGeom prst="rect">
+            <a:avLst/>
+          </a:prstGeom>
+          <a:solidFill>
+            <a:schemeClr val="accent5"/>
+          </a:solidFill>
+          <a:ln>
+            <a:solidFill>
+              <a:schemeClr val="accent5"/>
+            </a:solidFill>
+          </a:ln>
+        </p:spPr>
+        <p:style>
+          <a:lnRef idx="2">
+            <a:schemeClr val="accent1">
+              <a:shade val="50000"/>
+            </a:schemeClr>
+          </a:lnRef>
+          <a:fillRef idx="1">
+            <a:schemeClr val="accent1"/>
+          </a:fillRef>
+          <a:effectRef idx="0">
+            <a:schemeClr val="accent1"/>
+          </a:effectRef>
+          <a:fontRef idx="minor">
+            <a:schemeClr val="lt1"/>
+          </a:fontRef>
+        </p:style>
+        <p:txBody>
+          <a:bodyPr rtlCol="0" anchor="ctr"/>
+          <a:lstStyle/>
+          <a:p>
+            <a:pPr algn="ctr"/>
+            <a:r>
+              <a:rPr lang="fr-CA" dirty="0"/>
+              <a:t>Changer l’état de l’indicateur de clignotement</a:t>
+            </a:r>
+          </a:p>
+        </p:txBody>
+      </p:sp>
+      <p:cxnSp>
+        <p:nvCxnSpPr>
+          <p:cNvPr id="4" name="Connecteur droit avec flèche 3">
+            <a:extLst>
+              <a:ext uri="{FF2B5EF4-FFF2-40B4-BE49-F238E27FC236}">
+                <a16:creationId xmlns:a16="http://schemas.microsoft.com/office/drawing/2014/main" id="{FE8517B3-B2D3-4E7C-9E56-6F7CB4ACC28D}"/>
+              </a:ext>
+            </a:extLst>
+          </p:cNvPr>
+          <p:cNvCxnSpPr>
+            <a:stCxn id="18" idx="3"/>
+            <a:endCxn id="24" idx="1"/>
+          </p:cNvCxnSpPr>
+          <p:nvPr/>
+        </p:nvCxnSpPr>
+        <p:spPr>
+          <a:xfrm>
+            <a:off x="7485921" y="2627717"/>
+            <a:ext cx="1072836" cy="11760"/>
+          </a:xfrm>
+          <a:prstGeom prst="straightConnector1">
+            <a:avLst/>
+          </a:prstGeom>
+          <a:ln>
+            <a:tailEnd type="triangle"/>
+          </a:ln>
+        </p:spPr>
+        <p:style>
+          <a:lnRef idx="1">
+            <a:schemeClr val="accent1"/>
+          </a:lnRef>
+          <a:fillRef idx="0">
+            <a:schemeClr val="accent1"/>
+          </a:fillRef>
+          <a:effectRef idx="0">
+            <a:schemeClr val="accent1"/>
+          </a:effectRef>
+          <a:fontRef idx="minor">
+            <a:schemeClr val="tx1"/>
+          </a:fontRef>
+        </p:style>
+      </p:cxnSp>
+      <p:sp>
+        <p:nvSpPr>
+          <p:cNvPr id="30" name="ZoneTexte 29">
+            <a:extLst>
+              <a:ext uri="{FF2B5EF4-FFF2-40B4-BE49-F238E27FC236}">
+                <a16:creationId xmlns:a16="http://schemas.microsoft.com/office/drawing/2014/main" id="{82D66A4F-8A5F-49F0-B284-BF2893090C88}"/>
+              </a:ext>
+            </a:extLst>
+          </p:cNvPr>
+          <p:cNvSpPr txBox="1"/>
+          <p:nvPr/>
+        </p:nvSpPr>
+        <p:spPr>
+          <a:xfrm>
+            <a:off x="7741348" y="2362478"/>
+            <a:ext cx="565265" cy="276999"/>
+          </a:xfrm>
+          <a:prstGeom prst="rect">
+            <a:avLst/>
+          </a:prstGeom>
+          <a:noFill/>
+        </p:spPr>
+        <p:txBody>
+          <a:bodyPr wrap="square" rtlCol="0">
+            <a:spAutoFit/>
+          </a:bodyPr>
+          <a:lstStyle/>
+          <a:p>
+            <a:pPr algn="ctr"/>
+            <a:r>
+              <a:rPr lang="fr-CA" sz="1200" dirty="0"/>
+              <a:t>oui</a:t>
+            </a:r>
+          </a:p>
+        </p:txBody>
+      </p:sp>
+      <p:cxnSp>
+        <p:nvCxnSpPr>
+          <p:cNvPr id="13" name="Connecteur : en angle 12">
+            <a:extLst>
+              <a:ext uri="{FF2B5EF4-FFF2-40B4-BE49-F238E27FC236}">
+                <a16:creationId xmlns:a16="http://schemas.microsoft.com/office/drawing/2014/main" id="{9B82D46E-A86F-49B6-B0F9-D5BCB6C94835}"/>
+              </a:ext>
+            </a:extLst>
+          </p:cNvPr>
+          <p:cNvCxnSpPr>
+            <a:cxnSpLocks/>
+            <a:stCxn id="18" idx="2"/>
+            <a:endCxn id="23" idx="0"/>
+          </p:cNvCxnSpPr>
+          <p:nvPr/>
+        </p:nvCxnSpPr>
+        <p:spPr>
+          <a:xfrm rot="5400000">
+            <a:off x="4307585" y="1570293"/>
+            <a:ext cx="562771" cy="3620504"/>
+          </a:xfrm>
+          <a:prstGeom prst="bentConnector3">
+            <a:avLst/>
+          </a:prstGeom>
+          <a:ln>
+            <a:tailEnd type="triangle"/>
+          </a:ln>
+        </p:spPr>
+        <p:style>
+          <a:lnRef idx="1">
+            <a:schemeClr val="accent1"/>
+          </a:lnRef>
+          <a:fillRef idx="0">
+            <a:schemeClr val="accent1"/>
+          </a:fillRef>
+          <a:effectRef idx="0">
+            <a:schemeClr val="accent1"/>
+          </a:effectRef>
+          <a:fontRef idx="minor">
+            <a:schemeClr val="tx1"/>
+          </a:fontRef>
+        </p:style>
+      </p:cxnSp>
+      <p:cxnSp>
+        <p:nvCxnSpPr>
+          <p:cNvPr id="16" name="Connecteur : en angle 15">
+            <a:extLst>
+              <a:ext uri="{FF2B5EF4-FFF2-40B4-BE49-F238E27FC236}">
+                <a16:creationId xmlns:a16="http://schemas.microsoft.com/office/drawing/2014/main" id="{190E9A05-6F57-4594-9B5D-51CCBD181BD4}"/>
+              </a:ext>
+            </a:extLst>
+          </p:cNvPr>
+          <p:cNvCxnSpPr>
+            <a:cxnSpLocks/>
+            <a:stCxn id="24" idx="2"/>
+            <a:endCxn id="23" idx="0"/>
+          </p:cNvCxnSpPr>
+          <p:nvPr/>
+        </p:nvCxnSpPr>
+        <p:spPr>
+          <a:xfrm rot="5400000">
+            <a:off x="5936585" y="-46942"/>
+            <a:ext cx="551007" cy="6866739"/>
+          </a:xfrm>
+          <a:prstGeom prst="bentConnector3">
+            <a:avLst/>
+          </a:prstGeom>
+          <a:ln>
+            <a:tailEnd type="triangle"/>
+          </a:ln>
+        </p:spPr>
+        <p:style>
+          <a:lnRef idx="1">
+            <a:schemeClr val="accent1"/>
+          </a:lnRef>
+          <a:fillRef idx="0">
+            <a:schemeClr val="accent1"/>
+          </a:fillRef>
+          <a:effectRef idx="0">
+            <a:schemeClr val="accent1"/>
+          </a:effectRef>
+          <a:fontRef idx="minor">
+            <a:schemeClr val="tx1"/>
+          </a:fontRef>
+        </p:style>
+      </p:cxnSp>
+      <p:sp>
+        <p:nvSpPr>
+          <p:cNvPr id="32" name="ZoneTexte 31">
+            <a:extLst>
+              <a:ext uri="{FF2B5EF4-FFF2-40B4-BE49-F238E27FC236}">
+                <a16:creationId xmlns:a16="http://schemas.microsoft.com/office/drawing/2014/main" id="{D39F6767-85FF-41D8-A94F-A1907E5DFB17}"/>
+              </a:ext>
+            </a:extLst>
+          </p:cNvPr>
+          <p:cNvSpPr txBox="1"/>
+          <p:nvPr/>
+        </p:nvSpPr>
+        <p:spPr>
+          <a:xfrm>
+            <a:off x="5896204" y="3094297"/>
+            <a:ext cx="565265" cy="276999"/>
+          </a:xfrm>
+          <a:prstGeom prst="rect">
+            <a:avLst/>
+          </a:prstGeom>
+          <a:noFill/>
+        </p:spPr>
+        <p:txBody>
+          <a:bodyPr wrap="square" rtlCol="0">
+            <a:spAutoFit/>
+          </a:bodyPr>
+          <a:lstStyle/>
+          <a:p>
+            <a:pPr algn="ctr"/>
+            <a:r>
+              <a:rPr lang="fr-CA" sz="1200" dirty="0"/>
+              <a:t>non</a:t>
+            </a:r>
+          </a:p>
+        </p:txBody>
+      </p:sp>
+      <p:sp>
+        <p:nvSpPr>
+          <p:cNvPr id="33" name="Rectangle 32">
+            <a:extLst>
+              <a:ext uri="{FF2B5EF4-FFF2-40B4-BE49-F238E27FC236}">
+                <a16:creationId xmlns:a16="http://schemas.microsoft.com/office/drawing/2014/main" id="{8C8D7E53-842A-46ED-9846-4B29B3C5EC99}"/>
+              </a:ext>
+            </a:extLst>
+          </p:cNvPr>
+          <p:cNvSpPr/>
+          <p:nvPr/>
+        </p:nvSpPr>
+        <p:spPr>
+          <a:xfrm>
+            <a:off x="5231461" y="5069304"/>
+            <a:ext cx="2173399" cy="942894"/>
+          </a:xfrm>
+          <a:prstGeom prst="rect">
+            <a:avLst/>
+          </a:prstGeom>
+          <a:solidFill>
+            <a:schemeClr val="accent5"/>
+          </a:solidFill>
+          <a:ln>
+            <a:solidFill>
+              <a:schemeClr val="accent5"/>
+            </a:solidFill>
+          </a:ln>
+        </p:spPr>
+        <p:style>
+          <a:lnRef idx="2">
+            <a:schemeClr val="accent1">
+              <a:shade val="50000"/>
+            </a:schemeClr>
+          </a:lnRef>
+          <a:fillRef idx="1">
+            <a:schemeClr val="accent1"/>
+          </a:fillRef>
+          <a:effectRef idx="0">
+            <a:schemeClr val="accent1"/>
+          </a:effectRef>
+          <a:fontRef idx="minor">
+            <a:schemeClr val="lt1"/>
+          </a:fontRef>
+        </p:style>
+        <p:txBody>
+          <a:bodyPr rtlCol="0" anchor="ctr"/>
+          <a:lstStyle/>
+          <a:p>
+            <a:pPr algn="ctr"/>
+            <a:r>
+              <a:rPr lang="fr-CA" dirty="0"/>
+              <a:t>Allumer et éteindre la DEL.</a:t>
+            </a:r>
+          </a:p>
+        </p:txBody>
+      </p:sp>
+      <p:sp>
+        <p:nvSpPr>
+          <p:cNvPr id="35" name="Rectangle 34">
+            <a:extLst>
+              <a:ext uri="{FF2B5EF4-FFF2-40B4-BE49-F238E27FC236}">
+                <a16:creationId xmlns:a16="http://schemas.microsoft.com/office/drawing/2014/main" id="{490A32CE-56FF-4E7C-9165-D6AFDD28B762}"/>
+              </a:ext>
+            </a:extLst>
+          </p:cNvPr>
+          <p:cNvSpPr/>
+          <p:nvPr/>
+        </p:nvSpPr>
+        <p:spPr>
+          <a:xfrm>
+            <a:off x="1692018" y="4987637"/>
+            <a:ext cx="2173399" cy="1106228"/>
+          </a:xfrm>
+          <a:prstGeom prst="rect">
+            <a:avLst/>
+          </a:prstGeom>
+          <a:solidFill>
+            <a:schemeClr val="accent5"/>
+          </a:solidFill>
+          <a:ln>
+            <a:solidFill>
+              <a:schemeClr val="accent5"/>
+            </a:solidFill>
+          </a:ln>
+        </p:spPr>
+        <p:style>
+          <a:lnRef idx="2">
+            <a:schemeClr val="accent1">
+              <a:shade val="50000"/>
+            </a:schemeClr>
+          </a:lnRef>
+          <a:fillRef idx="1">
+            <a:schemeClr val="accent1"/>
+          </a:fillRef>
+          <a:effectRef idx="0">
+            <a:schemeClr val="accent1"/>
+          </a:effectRef>
+          <a:fontRef idx="minor">
+            <a:schemeClr val="lt1"/>
+          </a:fontRef>
+        </p:style>
+        <p:txBody>
+          <a:bodyPr rtlCol="0" anchor="ctr"/>
+          <a:lstStyle/>
+          <a:p>
+            <a:pPr algn="ctr"/>
+            <a:r>
+              <a:rPr lang="fr-CA" dirty="0"/>
+              <a:t>Est-ce que l’indicateur de clignotement est actif?</a:t>
+            </a:r>
+          </a:p>
+        </p:txBody>
+      </p:sp>
+      <p:cxnSp>
+        <p:nvCxnSpPr>
+          <p:cNvPr id="39" name="Connecteur droit avec flèche 38">
+            <a:extLst>
+              <a:ext uri="{FF2B5EF4-FFF2-40B4-BE49-F238E27FC236}">
+                <a16:creationId xmlns:a16="http://schemas.microsoft.com/office/drawing/2014/main" id="{95D20A08-83BD-409D-A678-0C3F8074FA05}"/>
+              </a:ext>
+            </a:extLst>
+          </p:cNvPr>
+          <p:cNvCxnSpPr>
+            <a:cxnSpLocks/>
+            <a:stCxn id="15" idx="2"/>
+            <a:endCxn id="23" idx="0"/>
+          </p:cNvCxnSpPr>
+          <p:nvPr/>
+        </p:nvCxnSpPr>
+        <p:spPr>
+          <a:xfrm>
+            <a:off x="2778718" y="3099160"/>
+            <a:ext cx="0" cy="562771"/>
+          </a:xfrm>
+          <a:prstGeom prst="straightConnector1">
+            <a:avLst/>
+          </a:prstGeom>
+          <a:ln>
+            <a:tailEnd type="triangle"/>
+          </a:ln>
+        </p:spPr>
+        <p:style>
+          <a:lnRef idx="1">
+            <a:schemeClr val="accent1"/>
+          </a:lnRef>
+          <a:fillRef idx="0">
+            <a:schemeClr val="accent1"/>
+          </a:fillRef>
+          <a:effectRef idx="0">
+            <a:schemeClr val="accent1"/>
+          </a:effectRef>
+          <a:fontRef idx="minor">
+            <a:schemeClr val="tx1"/>
+          </a:fontRef>
+        </p:style>
+      </p:cxnSp>
+      <p:cxnSp>
+        <p:nvCxnSpPr>
+          <p:cNvPr id="48" name="Connecteur droit avec flèche 47">
+            <a:extLst>
+              <a:ext uri="{FF2B5EF4-FFF2-40B4-BE49-F238E27FC236}">
+                <a16:creationId xmlns:a16="http://schemas.microsoft.com/office/drawing/2014/main" id="{A436105C-05E8-4723-86E3-7A2C8438854F}"/>
+              </a:ext>
+            </a:extLst>
+          </p:cNvPr>
+          <p:cNvCxnSpPr>
+            <a:cxnSpLocks/>
+            <a:stCxn id="23" idx="2"/>
+            <a:endCxn id="35" idx="0"/>
+          </p:cNvCxnSpPr>
+          <p:nvPr/>
+        </p:nvCxnSpPr>
+        <p:spPr>
+          <a:xfrm>
+            <a:off x="2778718" y="4579397"/>
+            <a:ext cx="0" cy="408240"/>
+          </a:xfrm>
+          <a:prstGeom prst="straightConnector1">
+            <a:avLst/>
+          </a:prstGeom>
+          <a:ln>
+            <a:tailEnd type="triangle"/>
+          </a:ln>
+        </p:spPr>
+        <p:style>
+          <a:lnRef idx="1">
+            <a:schemeClr val="accent1"/>
+          </a:lnRef>
+          <a:fillRef idx="0">
+            <a:schemeClr val="accent1"/>
+          </a:fillRef>
+          <a:effectRef idx="0">
+            <a:schemeClr val="accent1"/>
+          </a:effectRef>
+          <a:fontRef idx="minor">
+            <a:schemeClr val="tx1"/>
+          </a:fontRef>
+        </p:style>
+      </p:cxnSp>
+      <p:cxnSp>
+        <p:nvCxnSpPr>
+          <p:cNvPr id="51" name="Connecteur droit avec flèche 50">
+            <a:extLst>
+              <a:ext uri="{FF2B5EF4-FFF2-40B4-BE49-F238E27FC236}">
+                <a16:creationId xmlns:a16="http://schemas.microsoft.com/office/drawing/2014/main" id="{7348BDD4-0B99-493C-B0F9-0E3998C5F7D8}"/>
+              </a:ext>
+            </a:extLst>
+          </p:cNvPr>
+          <p:cNvCxnSpPr>
+            <a:stCxn id="35" idx="3"/>
+            <a:endCxn id="33" idx="1"/>
+          </p:cNvCxnSpPr>
+          <p:nvPr/>
+        </p:nvCxnSpPr>
+        <p:spPr>
+          <a:xfrm>
+            <a:off x="3865417" y="5540751"/>
+            <a:ext cx="1366044" cy="0"/>
+          </a:xfrm>
+          <a:prstGeom prst="straightConnector1">
+            <a:avLst/>
+          </a:prstGeom>
+          <a:ln>
+            <a:tailEnd type="triangle"/>
+          </a:ln>
+        </p:spPr>
+        <p:style>
+          <a:lnRef idx="1">
+            <a:schemeClr val="accent1"/>
+          </a:lnRef>
+          <a:fillRef idx="0">
+            <a:schemeClr val="accent1"/>
+          </a:fillRef>
+          <a:effectRef idx="0">
+            <a:schemeClr val="accent1"/>
+          </a:effectRef>
+          <a:fontRef idx="minor">
+            <a:schemeClr val="tx1"/>
+          </a:fontRef>
+        </p:style>
+      </p:cxnSp>
+      <p:cxnSp>
+        <p:nvCxnSpPr>
+          <p:cNvPr id="63" name="Connecteur : en angle 62">
+            <a:extLst>
+              <a:ext uri="{FF2B5EF4-FFF2-40B4-BE49-F238E27FC236}">
+                <a16:creationId xmlns:a16="http://schemas.microsoft.com/office/drawing/2014/main" id="{D8764911-17E8-4573-9491-2EC1174737D8}"/>
+              </a:ext>
+            </a:extLst>
+          </p:cNvPr>
+          <p:cNvCxnSpPr>
+            <a:stCxn id="35" idx="2"/>
+            <a:endCxn id="12" idx="1"/>
+          </p:cNvCxnSpPr>
+          <p:nvPr/>
+        </p:nvCxnSpPr>
+        <p:spPr>
+          <a:xfrm rot="5400000" flipH="1">
+            <a:off x="-45245" y="3269902"/>
+            <a:ext cx="4561228" cy="1086699"/>
+          </a:xfrm>
+          <a:prstGeom prst="bentConnector4">
+            <a:avLst>
+              <a:gd name="adj1" fmla="val -5012"/>
+              <a:gd name="adj2" fmla="val 121036"/>
+            </a:avLst>
+          </a:prstGeom>
+          <a:ln>
+            <a:tailEnd type="triangle"/>
+          </a:ln>
+        </p:spPr>
+        <p:style>
+          <a:lnRef idx="1">
+            <a:schemeClr val="accent1"/>
+          </a:lnRef>
+          <a:fillRef idx="0">
+            <a:schemeClr val="accent1"/>
+          </a:fillRef>
+          <a:effectRef idx="0">
+            <a:schemeClr val="accent1"/>
+          </a:effectRef>
+          <a:fontRef idx="minor">
+            <a:schemeClr val="tx1"/>
+          </a:fontRef>
+        </p:style>
+      </p:cxnSp>
+      <p:cxnSp>
+        <p:nvCxnSpPr>
+          <p:cNvPr id="65" name="Connecteur : en angle 64">
+            <a:extLst>
+              <a:ext uri="{FF2B5EF4-FFF2-40B4-BE49-F238E27FC236}">
+                <a16:creationId xmlns:a16="http://schemas.microsoft.com/office/drawing/2014/main" id="{9B54337D-1F68-417F-B06E-FFD67F1B050B}"/>
+              </a:ext>
+            </a:extLst>
+          </p:cNvPr>
+          <p:cNvCxnSpPr>
+            <a:stCxn id="33" idx="2"/>
+            <a:endCxn id="12" idx="1"/>
+          </p:cNvCxnSpPr>
+          <p:nvPr/>
+        </p:nvCxnSpPr>
+        <p:spPr>
+          <a:xfrm rot="5400000" flipH="1">
+            <a:off x="1765309" y="1459347"/>
+            <a:ext cx="4479561" cy="4626142"/>
+          </a:xfrm>
+          <a:prstGeom prst="bentConnector4">
+            <a:avLst>
+              <a:gd name="adj1" fmla="val -6959"/>
+              <a:gd name="adj2" fmla="val 104941"/>
+            </a:avLst>
+          </a:prstGeom>
+          <a:ln>
+            <a:tailEnd type="triangle"/>
+          </a:ln>
+        </p:spPr>
+        <p:style>
+          <a:lnRef idx="1">
+            <a:schemeClr val="accent1"/>
+          </a:lnRef>
+          <a:fillRef idx="0">
+            <a:schemeClr val="accent1"/>
+          </a:fillRef>
+          <a:effectRef idx="0">
+            <a:schemeClr val="accent1"/>
+          </a:effectRef>
+          <a:fontRef idx="minor">
+            <a:schemeClr val="tx1"/>
+          </a:fontRef>
+        </p:style>
+      </p:cxnSp>
+      <p:sp>
+        <p:nvSpPr>
+          <p:cNvPr id="67" name="ZoneTexte 66">
+            <a:extLst>
+              <a:ext uri="{FF2B5EF4-FFF2-40B4-BE49-F238E27FC236}">
+                <a16:creationId xmlns:a16="http://schemas.microsoft.com/office/drawing/2014/main" id="{384176A1-FDF1-4CCB-AFB0-7606CC82811B}"/>
+              </a:ext>
+            </a:extLst>
+          </p:cNvPr>
+          <p:cNvSpPr txBox="1"/>
+          <p:nvPr/>
+        </p:nvSpPr>
+        <p:spPr>
+          <a:xfrm>
+            <a:off x="4284421" y="5310856"/>
+            <a:ext cx="565265" cy="276999"/>
+          </a:xfrm>
+          <a:prstGeom prst="rect">
+            <a:avLst/>
+          </a:prstGeom>
+          <a:noFill/>
+        </p:spPr>
+        <p:txBody>
+          <a:bodyPr wrap="square" rtlCol="0">
+            <a:spAutoFit/>
+          </a:bodyPr>
+          <a:lstStyle/>
+          <a:p>
+            <a:pPr algn="ctr"/>
+            <a:r>
+              <a:rPr lang="fr-CA" sz="1200" dirty="0"/>
+              <a:t>oui</a:t>
+            </a:r>
+          </a:p>
+        </p:txBody>
+      </p:sp>
+      <p:sp>
+        <p:nvSpPr>
+          <p:cNvPr id="68" name="ZoneTexte 67">
+            <a:extLst>
+              <a:ext uri="{FF2B5EF4-FFF2-40B4-BE49-F238E27FC236}">
+                <a16:creationId xmlns:a16="http://schemas.microsoft.com/office/drawing/2014/main" id="{078C4111-2A88-40D8-AFFE-AC4A60F00E7F}"/>
+              </a:ext>
+            </a:extLst>
+          </p:cNvPr>
+          <p:cNvSpPr txBox="1"/>
+          <p:nvPr/>
+        </p:nvSpPr>
+        <p:spPr>
+          <a:xfrm>
+            <a:off x="2285107" y="3079137"/>
+            <a:ext cx="565265" cy="276999"/>
+          </a:xfrm>
+          <a:prstGeom prst="rect">
+            <a:avLst/>
+          </a:prstGeom>
+          <a:noFill/>
+        </p:spPr>
+        <p:txBody>
+          <a:bodyPr wrap="square" rtlCol="0">
+            <a:spAutoFit/>
+          </a:bodyPr>
+          <a:lstStyle/>
+          <a:p>
+            <a:pPr algn="ctr"/>
+            <a:r>
+              <a:rPr lang="fr-CA" sz="1200" dirty="0"/>
+              <a:t>non</a:t>
+            </a:r>
+          </a:p>
+        </p:txBody>
+      </p:sp>
+      <p:sp>
+        <p:nvSpPr>
+          <p:cNvPr id="69" name="ZoneTexte 68">
+            <a:extLst>
+              <a:ext uri="{FF2B5EF4-FFF2-40B4-BE49-F238E27FC236}">
+                <a16:creationId xmlns:a16="http://schemas.microsoft.com/office/drawing/2014/main" id="{FE60C9BE-257A-40EC-9E64-E25780075D34}"/>
+              </a:ext>
+            </a:extLst>
+          </p:cNvPr>
+          <p:cNvSpPr txBox="1"/>
+          <p:nvPr/>
+        </p:nvSpPr>
+        <p:spPr>
+          <a:xfrm>
+            <a:off x="2285107" y="6057011"/>
+            <a:ext cx="565265" cy="276999"/>
+          </a:xfrm>
+          <a:prstGeom prst="rect">
+            <a:avLst/>
+          </a:prstGeom>
+          <a:noFill/>
+        </p:spPr>
+        <p:txBody>
+          <a:bodyPr wrap="square" rtlCol="0">
+            <a:spAutoFit/>
+          </a:bodyPr>
+          <a:lstStyle/>
+          <a:p>
+            <a:pPr algn="ctr"/>
+            <a:r>
+              <a:rPr lang="fr-CA" sz="1200" dirty="0"/>
+              <a:t>non</a:t>
+            </a:r>
+          </a:p>
+        </p:txBody>
+      </p:sp>
+    </p:spTree>
+    <p:extLst>
+      <p:ext uri="{BB962C8B-B14F-4D97-AF65-F5344CB8AC3E}">
+        <p14:creationId xmlns:p14="http://schemas.microsoft.com/office/powerpoint/2010/main" val="2682320389"/>
+      </p:ext>
+    </p:extLst>
+  </p:cSld>
+  <p:clrMapOvr>
+    <a:masterClrMapping/>
+  </p:clrMapOvr>
+</p:sld>
+</file>
+
+<file path=ppt/slides/slide6.xml><?xml version="1.0" encoding="utf-8"?>
+<p:sld xmlns:a="http://schemas.openxmlformats.org/drawingml/2006/main" xmlns:r="http://schemas.openxmlformats.org/officeDocument/2006/relationships" xmlns:p="http://schemas.openxmlformats.org/presentationml/2006/main">
+  <p:cSld>
+    <p:spTree>
+      <p:nvGrpSpPr>
+        <p:cNvPr id="1" name=""/>
+        <p:cNvGrpSpPr/>
+        <p:nvPr/>
+      </p:nvGrpSpPr>
+      <p:grpSpPr>
+        <a:xfrm>
+          <a:off x="0" y="0"/>
+          <a:ext cx="0" cy="0"/>
+          <a:chOff x="0" y="0"/>
+          <a:chExt cx="0" cy="0"/>
+        </a:xfrm>
+      </p:grpSpPr>
+      <p:sp>
+        <p:nvSpPr>
+          <p:cNvPr id="2" name="Titre 1">
+            <a:extLst>
+              <a:ext uri="{FF2B5EF4-FFF2-40B4-BE49-F238E27FC236}">
+                <a16:creationId xmlns:a16="http://schemas.microsoft.com/office/drawing/2014/main" id="{7005A587-273D-4A3C-859E-17AD32EABF34}"/>
+              </a:ext>
+            </a:extLst>
+          </p:cNvPr>
+          <p:cNvSpPr>
+            <a:spLocks noGrp="1"/>
+          </p:cNvSpPr>
+          <p:nvPr>
+            <p:ph type="title"/>
+          </p:nvPr>
+        </p:nvSpPr>
+        <p:spPr>
+          <a:xfrm>
+            <a:off x="838200" y="365125"/>
+            <a:ext cx="10515600" cy="702869"/>
+          </a:xfrm>
+        </p:spPr>
+        <p:txBody>
+          <a:bodyPr>
+            <a:normAutofit/>
+          </a:bodyPr>
+          <a:lstStyle/>
+          <a:p>
+            <a:r>
+              <a:rPr lang="en-CA" sz="2400" dirty="0"/>
               <a:t>CODER LA DÉTECTION DE CHANGEMENT D’ÉTAT : CODE</a:t>
             </a:r>
             <a:endParaRPr lang="fr-CA" sz="2400" dirty="0"/>
@@ -5359,7 +6765,7 @@
 </p:sld>
 </file>
 
-<file path=ppt/slides/slide6.xml><?xml version="1.0" encoding="utf-8"?>
+<file path=ppt/slides/slide7.xml><?xml version="1.0" encoding="utf-8"?>
 <p:sld xmlns:a="http://schemas.openxmlformats.org/drawingml/2006/main" xmlns:r="http://schemas.openxmlformats.org/officeDocument/2006/relationships" xmlns:p="http://schemas.openxmlformats.org/presentationml/2006/main">
   <p:cSld>
     <p:spTree>

</xml_diff>